<commit_message>
Spring Social QQ&微信登录模式的实现 part01
</commit_message>
<xml_diff>
--- a/PhotoHelper.pptx
+++ b/PhotoHelper.pptx
@@ -7,6 +7,9 @@
   <p:sldIdLst>
     <p:sldId id="256" r:id="rId2"/>
     <p:sldId id="257" r:id="rId3"/>
+    <p:sldId id="258" r:id="rId4"/>
+    <p:sldId id="259" r:id="rId5"/>
+    <p:sldId id="260" r:id="rId6"/>
   </p:sldIdLst>
   <p:sldSz cx="12192000" cy="6858000"/>
   <p:notesSz cx="6858000" cy="9144000"/>
@@ -244,7 +247,7 @@
           <a:p>
             <a:fld id="{0FF76650-0B1F-465D-8528-786AADC9FDC5}" type="datetimeFigureOut">
               <a:rPr lang="zh-CN" altLang="en-US" smtClean="0"/>
-              <a:t>2017/10/24</a:t>
+              <a:t>2017/10/26</a:t>
             </a:fld>
             <a:endParaRPr lang="zh-CN" altLang="en-US"/>
           </a:p>
@@ -414,7 +417,7 @@
           <a:p>
             <a:fld id="{0FF76650-0B1F-465D-8528-786AADC9FDC5}" type="datetimeFigureOut">
               <a:rPr lang="zh-CN" altLang="en-US" smtClean="0"/>
-              <a:t>2017/10/24</a:t>
+              <a:t>2017/10/26</a:t>
             </a:fld>
             <a:endParaRPr lang="zh-CN" altLang="en-US"/>
           </a:p>
@@ -594,7 +597,7 @@
           <a:p>
             <a:fld id="{0FF76650-0B1F-465D-8528-786AADC9FDC5}" type="datetimeFigureOut">
               <a:rPr lang="zh-CN" altLang="en-US" smtClean="0"/>
-              <a:t>2017/10/24</a:t>
+              <a:t>2017/10/26</a:t>
             </a:fld>
             <a:endParaRPr lang="zh-CN" altLang="en-US"/>
           </a:p>
@@ -764,7 +767,7 @@
           <a:p>
             <a:fld id="{0FF76650-0B1F-465D-8528-786AADC9FDC5}" type="datetimeFigureOut">
               <a:rPr lang="zh-CN" altLang="en-US" smtClean="0"/>
-              <a:t>2017/10/24</a:t>
+              <a:t>2017/10/26</a:t>
             </a:fld>
             <a:endParaRPr lang="zh-CN" altLang="en-US"/>
           </a:p>
@@ -1010,7 +1013,7 @@
           <a:p>
             <a:fld id="{0FF76650-0B1F-465D-8528-786AADC9FDC5}" type="datetimeFigureOut">
               <a:rPr lang="zh-CN" altLang="en-US" smtClean="0"/>
-              <a:t>2017/10/24</a:t>
+              <a:t>2017/10/26</a:t>
             </a:fld>
             <a:endParaRPr lang="zh-CN" altLang="en-US"/>
           </a:p>
@@ -1242,7 +1245,7 @@
           <a:p>
             <a:fld id="{0FF76650-0B1F-465D-8528-786AADC9FDC5}" type="datetimeFigureOut">
               <a:rPr lang="zh-CN" altLang="en-US" smtClean="0"/>
-              <a:t>2017/10/24</a:t>
+              <a:t>2017/10/26</a:t>
             </a:fld>
             <a:endParaRPr lang="zh-CN" altLang="en-US"/>
           </a:p>
@@ -1609,7 +1612,7 @@
           <a:p>
             <a:fld id="{0FF76650-0B1F-465D-8528-786AADC9FDC5}" type="datetimeFigureOut">
               <a:rPr lang="zh-CN" altLang="en-US" smtClean="0"/>
-              <a:t>2017/10/24</a:t>
+              <a:t>2017/10/26</a:t>
             </a:fld>
             <a:endParaRPr lang="zh-CN" altLang="en-US"/>
           </a:p>
@@ -1727,7 +1730,7 @@
           <a:p>
             <a:fld id="{0FF76650-0B1F-465D-8528-786AADC9FDC5}" type="datetimeFigureOut">
               <a:rPr lang="zh-CN" altLang="en-US" smtClean="0"/>
-              <a:t>2017/10/24</a:t>
+              <a:t>2017/10/26</a:t>
             </a:fld>
             <a:endParaRPr lang="zh-CN" altLang="en-US"/>
           </a:p>
@@ -1822,7 +1825,7 @@
           <a:p>
             <a:fld id="{0FF76650-0B1F-465D-8528-786AADC9FDC5}" type="datetimeFigureOut">
               <a:rPr lang="zh-CN" altLang="en-US" smtClean="0"/>
-              <a:t>2017/10/24</a:t>
+              <a:t>2017/10/26</a:t>
             </a:fld>
             <a:endParaRPr lang="zh-CN" altLang="en-US"/>
           </a:p>
@@ -2099,7 +2102,7 @@
           <a:p>
             <a:fld id="{0FF76650-0B1F-465D-8528-786AADC9FDC5}" type="datetimeFigureOut">
               <a:rPr lang="zh-CN" altLang="en-US" smtClean="0"/>
-              <a:t>2017/10/24</a:t>
+              <a:t>2017/10/26</a:t>
             </a:fld>
             <a:endParaRPr lang="zh-CN" altLang="en-US"/>
           </a:p>
@@ -2352,7 +2355,7 @@
           <a:p>
             <a:fld id="{0FF76650-0B1F-465D-8528-786AADC9FDC5}" type="datetimeFigureOut">
               <a:rPr lang="zh-CN" altLang="en-US" smtClean="0"/>
-              <a:t>2017/10/24</a:t>
+              <a:t>2017/10/26</a:t>
             </a:fld>
             <a:endParaRPr lang="zh-CN" altLang="en-US"/>
           </a:p>
@@ -2565,7 +2568,7 @@
           <a:p>
             <a:fld id="{0FF76650-0B1F-465D-8528-786AADC9FDC5}" type="datetimeFigureOut">
               <a:rPr lang="zh-CN" altLang="en-US" smtClean="0"/>
-              <a:t>2017/10/24</a:t>
+              <a:t>2017/10/26</a:t>
             </a:fld>
             <a:endParaRPr lang="zh-CN" altLang="en-US"/>
           </a:p>
@@ -4395,6 +4398,2756 @@
 </p:sld>
 </file>
 
+<file path=ppt/slides/slide3.xml><?xml version="1.0" encoding="utf-8"?>
+<p:sld xmlns:a="http://schemas.openxmlformats.org/drawingml/2006/main" xmlns:r="http://schemas.openxmlformats.org/officeDocument/2006/relationships" xmlns:p="http://schemas.openxmlformats.org/presentationml/2006/main">
+  <p:cSld>
+    <p:spTree>
+      <p:nvGrpSpPr>
+        <p:cNvPr id="1" name=""/>
+        <p:cNvGrpSpPr/>
+        <p:nvPr/>
+      </p:nvGrpSpPr>
+      <p:grpSpPr>
+        <a:xfrm>
+          <a:off x="0" y="0"/>
+          <a:ext cx="0" cy="0"/>
+          <a:chOff x="0" y="0"/>
+          <a:chExt cx="0" cy="0"/>
+        </a:xfrm>
+      </p:grpSpPr>
+      <p:sp>
+        <p:nvSpPr>
+          <p:cNvPr id="39" name="矩形 38"/>
+          <p:cNvSpPr/>
+          <p:nvPr/>
+        </p:nvSpPr>
+        <p:spPr>
+          <a:xfrm>
+            <a:off x="496957" y="586409"/>
+            <a:ext cx="10475843" cy="5546034"/>
+          </a:xfrm>
+          <a:prstGeom prst="rect">
+            <a:avLst/>
+          </a:prstGeom>
+          <a:solidFill>
+            <a:schemeClr val="tx2">
+              <a:lumMod val="20000"/>
+              <a:lumOff val="80000"/>
+            </a:schemeClr>
+          </a:solidFill>
+        </p:spPr>
+        <p:style>
+          <a:lnRef idx="2">
+            <a:schemeClr val="accent1">
+              <a:shade val="50000"/>
+            </a:schemeClr>
+          </a:lnRef>
+          <a:fillRef idx="1">
+            <a:schemeClr val="accent1"/>
+          </a:fillRef>
+          <a:effectRef idx="0">
+            <a:schemeClr val="accent1"/>
+          </a:effectRef>
+          <a:fontRef idx="minor">
+            <a:schemeClr val="lt1"/>
+          </a:fontRef>
+        </p:style>
+        <p:txBody>
+          <a:bodyPr rtlCol="0" anchor="ctr"/>
+          <a:lstStyle/>
+          <a:p>
+            <a:pPr algn="ctr"/>
+            <a:endParaRPr lang="zh-CN" altLang="en-US"/>
+          </a:p>
+        </p:txBody>
+      </p:sp>
+      <p:sp>
+        <p:nvSpPr>
+          <p:cNvPr id="4" name="笑脸 3"/>
+          <p:cNvSpPr/>
+          <p:nvPr/>
+        </p:nvSpPr>
+        <p:spPr>
+          <a:xfrm>
+            <a:off x="2032553" y="1172818"/>
+            <a:ext cx="2126974" cy="1470991"/>
+          </a:xfrm>
+          <a:prstGeom prst="smileyFace">
+            <a:avLst/>
+          </a:prstGeom>
+          <a:solidFill>
+            <a:schemeClr val="accent1">
+              <a:lumMod val="40000"/>
+              <a:lumOff val="60000"/>
+            </a:schemeClr>
+          </a:solidFill>
+        </p:spPr>
+        <p:style>
+          <a:lnRef idx="2">
+            <a:schemeClr val="accent1">
+              <a:shade val="50000"/>
+            </a:schemeClr>
+          </a:lnRef>
+          <a:fillRef idx="1">
+            <a:schemeClr val="accent1"/>
+          </a:fillRef>
+          <a:effectRef idx="0">
+            <a:schemeClr val="accent1"/>
+          </a:effectRef>
+          <a:fontRef idx="minor">
+            <a:schemeClr val="lt1"/>
+          </a:fontRef>
+        </p:style>
+        <p:txBody>
+          <a:bodyPr rtlCol="0" anchor="ctr"/>
+          <a:lstStyle/>
+          <a:p>
+            <a:pPr algn="ctr"/>
+            <a:r>
+              <a:rPr lang="zh-CN" altLang="en-US" b="1" dirty="0" smtClean="0">
+                <a:solidFill>
+                  <a:schemeClr val="accent2">
+                    <a:lumMod val="75000"/>
+                  </a:schemeClr>
+                </a:solidFill>
+              </a:rPr>
+              <a:t>资源所有者</a:t>
+            </a:r>
+            <a:endParaRPr lang="en-US" altLang="zh-CN" b="1" dirty="0" smtClean="0">
+              <a:solidFill>
+                <a:schemeClr val="accent2">
+                  <a:lumMod val="75000"/>
+                </a:schemeClr>
+              </a:solidFill>
+            </a:endParaRPr>
+          </a:p>
+        </p:txBody>
+      </p:sp>
+      <p:sp>
+        <p:nvSpPr>
+          <p:cNvPr id="5" name="矩形 4"/>
+          <p:cNvSpPr/>
+          <p:nvPr/>
+        </p:nvSpPr>
+        <p:spPr>
+          <a:xfrm>
+            <a:off x="6698974" y="1123122"/>
+            <a:ext cx="4025347" cy="4820478"/>
+          </a:xfrm>
+          <a:prstGeom prst="rect">
+            <a:avLst/>
+          </a:prstGeom>
+          <a:solidFill>
+            <a:schemeClr val="bg2">
+              <a:lumMod val="90000"/>
+            </a:schemeClr>
+          </a:solidFill>
+          <a:ln>
+            <a:solidFill>
+              <a:schemeClr val="tx2">
+                <a:lumMod val="20000"/>
+                <a:lumOff val="80000"/>
+              </a:schemeClr>
+            </a:solidFill>
+          </a:ln>
+        </p:spPr>
+        <p:style>
+          <a:lnRef idx="2">
+            <a:schemeClr val="accent1">
+              <a:shade val="50000"/>
+            </a:schemeClr>
+          </a:lnRef>
+          <a:fillRef idx="1">
+            <a:schemeClr val="accent1"/>
+          </a:fillRef>
+          <a:effectRef idx="0">
+            <a:schemeClr val="accent1"/>
+          </a:effectRef>
+          <a:fontRef idx="minor">
+            <a:schemeClr val="lt1"/>
+          </a:fontRef>
+        </p:style>
+        <p:txBody>
+          <a:bodyPr rtlCol="0" anchor="t"/>
+          <a:lstStyle/>
+          <a:p>
+            <a:pPr algn="ctr"/>
+            <a:r>
+              <a:rPr lang="zh-CN" altLang="en-US" sz="2400" b="1" dirty="0" smtClean="0">
+                <a:solidFill>
+                  <a:schemeClr val="bg1"/>
+                </a:solidFill>
+                <a:latin typeface="Arial" panose="020B0604020202020204" pitchFamily="34" charset="0"/>
+                <a:cs typeface="Arial" panose="020B0604020202020204" pitchFamily="34" charset="0"/>
+              </a:rPr>
+              <a:t>服务提供商</a:t>
+            </a:r>
+            <a:endParaRPr lang="en-US" altLang="zh-CN" sz="2400" b="1" dirty="0" smtClean="0">
+              <a:solidFill>
+                <a:schemeClr val="bg1"/>
+              </a:solidFill>
+              <a:latin typeface="Arial" panose="020B0604020202020204" pitchFamily="34" charset="0"/>
+              <a:cs typeface="Arial" panose="020B0604020202020204" pitchFamily="34" charset="0"/>
+            </a:endParaRPr>
+          </a:p>
+          <a:p>
+            <a:pPr algn="ctr"/>
+            <a:r>
+              <a:rPr lang="en-US" altLang="zh-CN" sz="2400" b="1" dirty="0" smtClean="0">
+                <a:solidFill>
+                  <a:schemeClr val="bg1"/>
+                </a:solidFill>
+                <a:latin typeface="Arial" panose="020B0604020202020204" pitchFamily="34" charset="0"/>
+                <a:cs typeface="Arial" panose="020B0604020202020204" pitchFamily="34" charset="0"/>
+              </a:rPr>
+              <a:t>Provider</a:t>
+            </a:r>
+            <a:endParaRPr lang="zh-CN" altLang="en-US" sz="2400" b="1" dirty="0">
+              <a:solidFill>
+                <a:schemeClr val="bg1"/>
+              </a:solidFill>
+              <a:latin typeface="Arial" panose="020B0604020202020204" pitchFamily="34" charset="0"/>
+              <a:cs typeface="Arial" panose="020B0604020202020204" pitchFamily="34" charset="0"/>
+            </a:endParaRPr>
+          </a:p>
+        </p:txBody>
+      </p:sp>
+      <p:sp>
+        <p:nvSpPr>
+          <p:cNvPr id="6" name="矩形 5"/>
+          <p:cNvSpPr/>
+          <p:nvPr/>
+        </p:nvSpPr>
+        <p:spPr>
+          <a:xfrm>
+            <a:off x="1351721" y="4104861"/>
+            <a:ext cx="3448879" cy="1689652"/>
+          </a:xfrm>
+          <a:prstGeom prst="rect">
+            <a:avLst/>
+          </a:prstGeom>
+          <a:solidFill>
+            <a:schemeClr val="accent1">
+              <a:lumMod val="60000"/>
+              <a:lumOff val="40000"/>
+            </a:schemeClr>
+          </a:solidFill>
+        </p:spPr>
+        <p:style>
+          <a:lnRef idx="2">
+            <a:schemeClr val="accent1">
+              <a:shade val="50000"/>
+            </a:schemeClr>
+          </a:lnRef>
+          <a:fillRef idx="1">
+            <a:schemeClr val="accent1"/>
+          </a:fillRef>
+          <a:effectRef idx="0">
+            <a:schemeClr val="accent1"/>
+          </a:effectRef>
+          <a:fontRef idx="minor">
+            <a:schemeClr val="lt1"/>
+          </a:fontRef>
+        </p:style>
+        <p:txBody>
+          <a:bodyPr rtlCol="0" anchor="ctr"/>
+          <a:lstStyle/>
+          <a:p>
+            <a:pPr algn="ctr"/>
+            <a:r>
+              <a:rPr lang="zh-CN" altLang="en-US" dirty="0" smtClean="0"/>
+              <a:t>第三方应用</a:t>
+            </a:r>
+            <a:r>
+              <a:rPr lang="en-US" altLang="zh-CN" dirty="0" smtClean="0"/>
+              <a:t>Client</a:t>
+            </a:r>
+            <a:endParaRPr lang="zh-CN" altLang="en-US" dirty="0"/>
+          </a:p>
+        </p:txBody>
+      </p:sp>
+      <p:sp>
+        <p:nvSpPr>
+          <p:cNvPr id="7" name="矩形 6"/>
+          <p:cNvSpPr/>
+          <p:nvPr/>
+        </p:nvSpPr>
+        <p:spPr>
+          <a:xfrm>
+            <a:off x="7066722" y="2524538"/>
+            <a:ext cx="3299791" cy="1222513"/>
+          </a:xfrm>
+          <a:prstGeom prst="rect">
+            <a:avLst/>
+          </a:prstGeom>
+          <a:solidFill>
+            <a:schemeClr val="accent1">
+              <a:lumMod val="60000"/>
+              <a:lumOff val="40000"/>
+            </a:schemeClr>
+          </a:solidFill>
+        </p:spPr>
+        <p:style>
+          <a:lnRef idx="2">
+            <a:schemeClr val="accent1">
+              <a:shade val="50000"/>
+            </a:schemeClr>
+          </a:lnRef>
+          <a:fillRef idx="1">
+            <a:schemeClr val="accent1"/>
+          </a:fillRef>
+          <a:effectRef idx="0">
+            <a:schemeClr val="accent1"/>
+          </a:effectRef>
+          <a:fontRef idx="minor">
+            <a:schemeClr val="lt1"/>
+          </a:fontRef>
+        </p:style>
+        <p:txBody>
+          <a:bodyPr rtlCol="0" anchor="ctr"/>
+          <a:lstStyle/>
+          <a:p>
+            <a:pPr algn="ctr"/>
+            <a:r>
+              <a:rPr lang="zh-CN" altLang="en-US" dirty="0" smtClean="0"/>
+              <a:t>认证服务器</a:t>
+            </a:r>
+            <a:endParaRPr lang="en-US" altLang="zh-CN" dirty="0" smtClean="0"/>
+          </a:p>
+          <a:p>
+            <a:pPr algn="ctr"/>
+            <a:r>
+              <a:rPr lang="en-US" altLang="zh-CN" dirty="0" smtClean="0"/>
+              <a:t>Authorization Server</a:t>
+            </a:r>
+            <a:endParaRPr lang="zh-CN" altLang="en-US" dirty="0"/>
+          </a:p>
+        </p:txBody>
+      </p:sp>
+      <p:sp>
+        <p:nvSpPr>
+          <p:cNvPr id="8" name="矩形 7"/>
+          <p:cNvSpPr/>
+          <p:nvPr/>
+        </p:nvSpPr>
+        <p:spPr>
+          <a:xfrm>
+            <a:off x="7066722" y="4134678"/>
+            <a:ext cx="3299791" cy="1659835"/>
+          </a:xfrm>
+          <a:prstGeom prst="rect">
+            <a:avLst/>
+          </a:prstGeom>
+          <a:solidFill>
+            <a:schemeClr val="accent1">
+              <a:lumMod val="60000"/>
+              <a:lumOff val="40000"/>
+            </a:schemeClr>
+          </a:solidFill>
+        </p:spPr>
+        <p:style>
+          <a:lnRef idx="2">
+            <a:schemeClr val="accent1">
+              <a:shade val="50000"/>
+            </a:schemeClr>
+          </a:lnRef>
+          <a:fillRef idx="1">
+            <a:schemeClr val="accent1"/>
+          </a:fillRef>
+          <a:effectRef idx="0">
+            <a:schemeClr val="accent1"/>
+          </a:effectRef>
+          <a:fontRef idx="minor">
+            <a:schemeClr val="lt1"/>
+          </a:fontRef>
+        </p:style>
+        <p:txBody>
+          <a:bodyPr rtlCol="0" anchor="t"/>
+          <a:lstStyle/>
+          <a:p>
+            <a:pPr algn="ctr"/>
+            <a:r>
+              <a:rPr lang="zh-CN" altLang="en-US" dirty="0" smtClean="0"/>
+              <a:t>资源服务器</a:t>
+            </a:r>
+            <a:endParaRPr lang="en-US" altLang="zh-CN" dirty="0" smtClean="0"/>
+          </a:p>
+          <a:p>
+            <a:pPr algn="ctr"/>
+            <a:r>
+              <a:rPr lang="en-US" altLang="zh-CN" dirty="0" smtClean="0"/>
+              <a:t>Resource Server</a:t>
+            </a:r>
+            <a:endParaRPr lang="zh-CN" altLang="en-US" dirty="0"/>
+          </a:p>
+        </p:txBody>
+      </p:sp>
+      <p:cxnSp>
+        <p:nvCxnSpPr>
+          <p:cNvPr id="10" name="肘形连接符 9"/>
+          <p:cNvCxnSpPr>
+            <a:stCxn id="4" idx="2"/>
+            <a:endCxn id="6" idx="1"/>
+          </p:cNvCxnSpPr>
+          <p:nvPr/>
+        </p:nvCxnSpPr>
+        <p:spPr>
+          <a:xfrm rot="10800000" flipV="1">
+            <a:off x="1351721" y="1908313"/>
+            <a:ext cx="680832" cy="3041373"/>
+          </a:xfrm>
+          <a:prstGeom prst="bentConnector3">
+            <a:avLst>
+              <a:gd name="adj1" fmla="val 133577"/>
+            </a:avLst>
+          </a:prstGeom>
+          <a:ln>
+            <a:tailEnd type="triangle"/>
+          </a:ln>
+        </p:spPr>
+        <p:style>
+          <a:lnRef idx="1">
+            <a:schemeClr val="accent1"/>
+          </a:lnRef>
+          <a:fillRef idx="0">
+            <a:schemeClr val="accent1"/>
+          </a:fillRef>
+          <a:effectRef idx="0">
+            <a:schemeClr val="accent1"/>
+          </a:effectRef>
+          <a:fontRef idx="minor">
+            <a:schemeClr val="tx1"/>
+          </a:fontRef>
+        </p:style>
+      </p:cxnSp>
+      <p:sp>
+        <p:nvSpPr>
+          <p:cNvPr id="16" name="上箭头 15"/>
+          <p:cNvSpPr/>
+          <p:nvPr/>
+        </p:nvSpPr>
+        <p:spPr>
+          <a:xfrm>
+            <a:off x="2454964" y="2713383"/>
+            <a:ext cx="188843" cy="1321904"/>
+          </a:xfrm>
+          <a:prstGeom prst="upArrow">
+            <a:avLst/>
+          </a:prstGeom>
+        </p:spPr>
+        <p:style>
+          <a:lnRef idx="2">
+            <a:schemeClr val="accent1">
+              <a:shade val="50000"/>
+            </a:schemeClr>
+          </a:lnRef>
+          <a:fillRef idx="1">
+            <a:schemeClr val="accent1"/>
+          </a:fillRef>
+          <a:effectRef idx="0">
+            <a:schemeClr val="accent1"/>
+          </a:effectRef>
+          <a:fontRef idx="minor">
+            <a:schemeClr val="lt1"/>
+          </a:fontRef>
+        </p:style>
+        <p:txBody>
+          <a:bodyPr rtlCol="0" anchor="ctr"/>
+          <a:lstStyle/>
+          <a:p>
+            <a:pPr algn="ctr"/>
+            <a:endParaRPr lang="zh-CN" altLang="en-US"/>
+          </a:p>
+        </p:txBody>
+      </p:sp>
+      <p:sp>
+        <p:nvSpPr>
+          <p:cNvPr id="17" name="下箭头 16"/>
+          <p:cNvSpPr/>
+          <p:nvPr/>
+        </p:nvSpPr>
+        <p:spPr>
+          <a:xfrm>
+            <a:off x="3508513" y="2713383"/>
+            <a:ext cx="198783" cy="1321904"/>
+          </a:xfrm>
+          <a:prstGeom prst="downArrow">
+            <a:avLst/>
+          </a:prstGeom>
+        </p:spPr>
+        <p:style>
+          <a:lnRef idx="2">
+            <a:schemeClr val="accent1">
+              <a:shade val="50000"/>
+            </a:schemeClr>
+          </a:lnRef>
+          <a:fillRef idx="1">
+            <a:schemeClr val="accent1"/>
+          </a:fillRef>
+          <a:effectRef idx="0">
+            <a:schemeClr val="accent1"/>
+          </a:effectRef>
+          <a:fontRef idx="minor">
+            <a:schemeClr val="lt1"/>
+          </a:fontRef>
+        </p:style>
+        <p:txBody>
+          <a:bodyPr rtlCol="0" anchor="ctr"/>
+          <a:lstStyle/>
+          <a:p>
+            <a:pPr algn="ctr"/>
+            <a:endParaRPr lang="zh-CN" altLang="en-US"/>
+          </a:p>
+        </p:txBody>
+      </p:sp>
+      <p:sp>
+        <p:nvSpPr>
+          <p:cNvPr id="18" name="文本框 17"/>
+          <p:cNvSpPr txBox="1"/>
+          <p:nvPr/>
+        </p:nvSpPr>
+        <p:spPr>
+          <a:xfrm>
+            <a:off x="496957" y="3130826"/>
+            <a:ext cx="819455" cy="369332"/>
+          </a:xfrm>
+          <a:prstGeom prst="rect">
+            <a:avLst/>
+          </a:prstGeom>
+          <a:noFill/>
+        </p:spPr>
+        <p:txBody>
+          <a:bodyPr wrap="none" rtlCol="0">
+            <a:spAutoFit/>
+          </a:bodyPr>
+          <a:lstStyle/>
+          <a:p>
+            <a:r>
+              <a:rPr lang="en-US" altLang="zh-CN" dirty="0" smtClean="0"/>
+              <a:t>1.</a:t>
+            </a:r>
+            <a:r>
+              <a:rPr lang="zh-CN" altLang="en-US" dirty="0" smtClean="0"/>
+              <a:t>访问</a:t>
+            </a:r>
+            <a:endParaRPr lang="zh-CN" altLang="en-US" dirty="0"/>
+          </a:p>
+        </p:txBody>
+      </p:sp>
+      <p:sp>
+        <p:nvSpPr>
+          <p:cNvPr id="20" name="文本框 19"/>
+          <p:cNvSpPr txBox="1"/>
+          <p:nvPr/>
+        </p:nvSpPr>
+        <p:spPr>
+          <a:xfrm>
+            <a:off x="1689652" y="3130826"/>
+            <a:ext cx="834887" cy="646331"/>
+          </a:xfrm>
+          <a:prstGeom prst="rect">
+            <a:avLst/>
+          </a:prstGeom>
+          <a:noFill/>
+        </p:spPr>
+        <p:txBody>
+          <a:bodyPr wrap="square" rtlCol="0">
+            <a:spAutoFit/>
+          </a:bodyPr>
+          <a:lstStyle/>
+          <a:p>
+            <a:r>
+              <a:rPr lang="en-US" altLang="zh-CN" dirty="0" smtClean="0"/>
+              <a:t>2.</a:t>
+            </a:r>
+            <a:r>
+              <a:rPr lang="zh-CN" altLang="en-US" dirty="0" smtClean="0"/>
+              <a:t>请求</a:t>
+            </a:r>
+            <a:endParaRPr lang="en-US" altLang="zh-CN" dirty="0" smtClean="0"/>
+          </a:p>
+          <a:p>
+            <a:r>
+              <a:rPr lang="zh-CN" altLang="en-US" dirty="0"/>
+              <a:t>授权</a:t>
+            </a:r>
+          </a:p>
+        </p:txBody>
+      </p:sp>
+      <p:sp>
+        <p:nvSpPr>
+          <p:cNvPr id="21" name="文本框 20"/>
+          <p:cNvSpPr txBox="1"/>
+          <p:nvPr/>
+        </p:nvSpPr>
+        <p:spPr>
+          <a:xfrm>
+            <a:off x="3697355" y="3130826"/>
+            <a:ext cx="819455" cy="646331"/>
+          </a:xfrm>
+          <a:prstGeom prst="rect">
+            <a:avLst/>
+          </a:prstGeom>
+          <a:noFill/>
+        </p:spPr>
+        <p:txBody>
+          <a:bodyPr wrap="none" rtlCol="0">
+            <a:spAutoFit/>
+          </a:bodyPr>
+          <a:lstStyle/>
+          <a:p>
+            <a:r>
+              <a:rPr lang="en-US" altLang="zh-CN" dirty="0" smtClean="0"/>
+              <a:t>3.</a:t>
+            </a:r>
+            <a:r>
+              <a:rPr lang="zh-CN" altLang="en-US" dirty="0" smtClean="0"/>
+              <a:t>同意</a:t>
+            </a:r>
+            <a:endParaRPr lang="en-US" altLang="zh-CN" dirty="0" smtClean="0"/>
+          </a:p>
+          <a:p>
+            <a:r>
+              <a:rPr lang="zh-CN" altLang="en-US" dirty="0"/>
+              <a:t>授权</a:t>
+            </a:r>
+          </a:p>
+        </p:txBody>
+      </p:sp>
+      <p:sp>
+        <p:nvSpPr>
+          <p:cNvPr id="22" name="矩形 21"/>
+          <p:cNvSpPr/>
+          <p:nvPr/>
+        </p:nvSpPr>
+        <p:spPr>
+          <a:xfrm>
+            <a:off x="7653130" y="5009322"/>
+            <a:ext cx="2196548" cy="526774"/>
+          </a:xfrm>
+          <a:prstGeom prst="rect">
+            <a:avLst/>
+          </a:prstGeom>
+        </p:spPr>
+        <p:style>
+          <a:lnRef idx="2">
+            <a:schemeClr val="accent1">
+              <a:shade val="50000"/>
+            </a:schemeClr>
+          </a:lnRef>
+          <a:fillRef idx="1">
+            <a:schemeClr val="accent1"/>
+          </a:fillRef>
+          <a:effectRef idx="0">
+            <a:schemeClr val="accent1"/>
+          </a:effectRef>
+          <a:fontRef idx="minor">
+            <a:schemeClr val="lt1"/>
+          </a:fontRef>
+        </p:style>
+        <p:txBody>
+          <a:bodyPr rtlCol="0" anchor="ctr"/>
+          <a:lstStyle/>
+          <a:p>
+            <a:pPr algn="ctr"/>
+            <a:r>
+              <a:rPr lang="zh-CN" altLang="en-US" dirty="0" smtClean="0"/>
+              <a:t>用户数据</a:t>
+            </a:r>
+            <a:endParaRPr lang="zh-CN" altLang="en-US" dirty="0"/>
+          </a:p>
+        </p:txBody>
+      </p:sp>
+      <p:sp>
+        <p:nvSpPr>
+          <p:cNvPr id="27" name="右箭头 26"/>
+          <p:cNvSpPr/>
+          <p:nvPr/>
+        </p:nvSpPr>
+        <p:spPr>
+          <a:xfrm>
+            <a:off x="4800600" y="5178286"/>
+            <a:ext cx="2266122" cy="173935"/>
+          </a:xfrm>
+          <a:prstGeom prst="rightArrow">
+            <a:avLst/>
+          </a:prstGeom>
+        </p:spPr>
+        <p:style>
+          <a:lnRef idx="2">
+            <a:schemeClr val="accent1">
+              <a:shade val="50000"/>
+            </a:schemeClr>
+          </a:lnRef>
+          <a:fillRef idx="1">
+            <a:schemeClr val="accent1"/>
+          </a:fillRef>
+          <a:effectRef idx="0">
+            <a:schemeClr val="accent1"/>
+          </a:effectRef>
+          <a:fontRef idx="minor">
+            <a:schemeClr val="lt1"/>
+          </a:fontRef>
+        </p:style>
+        <p:txBody>
+          <a:bodyPr rtlCol="0" anchor="ctr"/>
+          <a:lstStyle/>
+          <a:p>
+            <a:pPr algn="ctr"/>
+            <a:endParaRPr lang="zh-CN" altLang="en-US"/>
+          </a:p>
+        </p:txBody>
+      </p:sp>
+      <p:sp>
+        <p:nvSpPr>
+          <p:cNvPr id="29" name="左箭头 28"/>
+          <p:cNvSpPr/>
+          <p:nvPr/>
+        </p:nvSpPr>
+        <p:spPr>
+          <a:xfrm>
+            <a:off x="4800600" y="5486399"/>
+            <a:ext cx="2266122" cy="168964"/>
+          </a:xfrm>
+          <a:prstGeom prst="leftArrow">
+            <a:avLst/>
+          </a:prstGeom>
+        </p:spPr>
+        <p:style>
+          <a:lnRef idx="2">
+            <a:schemeClr val="accent1">
+              <a:shade val="50000"/>
+            </a:schemeClr>
+          </a:lnRef>
+          <a:fillRef idx="1">
+            <a:schemeClr val="accent1"/>
+          </a:fillRef>
+          <a:effectRef idx="0">
+            <a:schemeClr val="accent1"/>
+          </a:effectRef>
+          <a:fontRef idx="minor">
+            <a:schemeClr val="lt1"/>
+          </a:fontRef>
+        </p:style>
+        <p:txBody>
+          <a:bodyPr rtlCol="0" anchor="ctr"/>
+          <a:lstStyle/>
+          <a:p>
+            <a:pPr algn="ctr"/>
+            <a:endParaRPr lang="zh-CN" altLang="en-US"/>
+          </a:p>
+        </p:txBody>
+      </p:sp>
+      <p:sp>
+        <p:nvSpPr>
+          <p:cNvPr id="31" name="右箭头 30"/>
+          <p:cNvSpPr/>
+          <p:nvPr/>
+        </p:nvSpPr>
+        <p:spPr>
+          <a:xfrm rot="8881867">
+            <a:off x="4647747" y="4085129"/>
+            <a:ext cx="2532379" cy="148019"/>
+          </a:xfrm>
+          <a:prstGeom prst="rightArrow">
+            <a:avLst/>
+          </a:prstGeom>
+        </p:spPr>
+        <p:style>
+          <a:lnRef idx="2">
+            <a:schemeClr val="accent1">
+              <a:shade val="50000"/>
+            </a:schemeClr>
+          </a:lnRef>
+          <a:fillRef idx="1">
+            <a:schemeClr val="accent1"/>
+          </a:fillRef>
+          <a:effectRef idx="0">
+            <a:schemeClr val="accent1"/>
+          </a:effectRef>
+          <a:fontRef idx="minor">
+            <a:schemeClr val="lt1"/>
+          </a:fontRef>
+        </p:style>
+        <p:txBody>
+          <a:bodyPr rtlCol="0" anchor="ctr"/>
+          <a:lstStyle/>
+          <a:p>
+            <a:pPr algn="ctr"/>
+            <a:endParaRPr lang="zh-CN" altLang="en-US"/>
+          </a:p>
+        </p:txBody>
+      </p:sp>
+      <p:sp>
+        <p:nvSpPr>
+          <p:cNvPr id="32" name="右箭头 31"/>
+          <p:cNvSpPr/>
+          <p:nvPr/>
+        </p:nvSpPr>
+        <p:spPr>
+          <a:xfrm rot="19712871">
+            <a:off x="4681556" y="3740306"/>
+            <a:ext cx="2532379" cy="149805"/>
+          </a:xfrm>
+          <a:prstGeom prst="rightArrow">
+            <a:avLst/>
+          </a:prstGeom>
+        </p:spPr>
+        <p:style>
+          <a:lnRef idx="2">
+            <a:schemeClr val="accent1">
+              <a:shade val="50000"/>
+            </a:schemeClr>
+          </a:lnRef>
+          <a:fillRef idx="1">
+            <a:schemeClr val="accent1"/>
+          </a:fillRef>
+          <a:effectRef idx="0">
+            <a:schemeClr val="accent1"/>
+          </a:effectRef>
+          <a:fontRef idx="minor">
+            <a:schemeClr val="lt1"/>
+          </a:fontRef>
+        </p:style>
+        <p:txBody>
+          <a:bodyPr rtlCol="0" anchor="ctr"/>
+          <a:lstStyle/>
+          <a:p>
+            <a:pPr algn="ctr"/>
+            <a:endParaRPr lang="zh-CN" altLang="en-US"/>
+          </a:p>
+        </p:txBody>
+      </p:sp>
+      <p:sp>
+        <p:nvSpPr>
+          <p:cNvPr id="33" name="文本框 32"/>
+          <p:cNvSpPr txBox="1"/>
+          <p:nvPr/>
+        </p:nvSpPr>
+        <p:spPr>
+          <a:xfrm rot="19672111">
+            <a:off x="5106055" y="3503962"/>
+            <a:ext cx="1281120" cy="369332"/>
+          </a:xfrm>
+          <a:prstGeom prst="rect">
+            <a:avLst/>
+          </a:prstGeom>
+          <a:noFill/>
+        </p:spPr>
+        <p:txBody>
+          <a:bodyPr wrap="none" rtlCol="0">
+            <a:spAutoFit/>
+          </a:bodyPr>
+          <a:lstStyle/>
+          <a:p>
+            <a:r>
+              <a:rPr lang="en-US" altLang="zh-CN" dirty="0"/>
+              <a:t>4</a:t>
+            </a:r>
+            <a:r>
+              <a:rPr lang="en-US" altLang="zh-CN" dirty="0" smtClean="0"/>
+              <a:t>.</a:t>
+            </a:r>
+            <a:r>
+              <a:rPr lang="zh-CN" altLang="en-US" dirty="0" smtClean="0"/>
+              <a:t>申请令牌</a:t>
+            </a:r>
+            <a:endParaRPr lang="zh-CN" altLang="en-US" dirty="0"/>
+          </a:p>
+        </p:txBody>
+      </p:sp>
+      <p:sp>
+        <p:nvSpPr>
+          <p:cNvPr id="34" name="文本框 33"/>
+          <p:cNvSpPr txBox="1"/>
+          <p:nvPr/>
+        </p:nvSpPr>
+        <p:spPr>
+          <a:xfrm rot="19652937">
+            <a:off x="5447160" y="4135213"/>
+            <a:ext cx="1281120" cy="369332"/>
+          </a:xfrm>
+          <a:prstGeom prst="rect">
+            <a:avLst/>
+          </a:prstGeom>
+          <a:noFill/>
+        </p:spPr>
+        <p:txBody>
+          <a:bodyPr wrap="none" rtlCol="0">
+            <a:spAutoFit/>
+          </a:bodyPr>
+          <a:lstStyle/>
+          <a:p>
+            <a:r>
+              <a:rPr lang="en-US" altLang="zh-CN" dirty="0" smtClean="0"/>
+              <a:t>5.</a:t>
+            </a:r>
+            <a:r>
+              <a:rPr lang="zh-CN" altLang="en-US" dirty="0" smtClean="0"/>
+              <a:t>发放令牌</a:t>
+            </a:r>
+            <a:endParaRPr lang="zh-CN" altLang="en-US" dirty="0"/>
+          </a:p>
+        </p:txBody>
+      </p:sp>
+      <p:sp>
+        <p:nvSpPr>
+          <p:cNvPr id="36" name="文本框 35"/>
+          <p:cNvSpPr txBox="1"/>
+          <p:nvPr/>
+        </p:nvSpPr>
+        <p:spPr>
+          <a:xfrm>
+            <a:off x="2172894" y="803486"/>
+            <a:ext cx="1814920" cy="369332"/>
+          </a:xfrm>
+          <a:prstGeom prst="rect">
+            <a:avLst/>
+          </a:prstGeom>
+          <a:solidFill>
+            <a:schemeClr val="accent2">
+              <a:lumMod val="20000"/>
+              <a:lumOff val="80000"/>
+            </a:schemeClr>
+          </a:solidFill>
+        </p:spPr>
+        <p:txBody>
+          <a:bodyPr wrap="none" rtlCol="0">
+            <a:spAutoFit/>
+          </a:bodyPr>
+          <a:lstStyle/>
+          <a:p>
+            <a:r>
+              <a:rPr lang="en-US" altLang="zh-CN" dirty="0" smtClean="0"/>
+              <a:t>Resource Owner</a:t>
+            </a:r>
+            <a:endParaRPr lang="zh-CN" altLang="en-US" dirty="0"/>
+          </a:p>
+        </p:txBody>
+      </p:sp>
+      <p:sp>
+        <p:nvSpPr>
+          <p:cNvPr id="37" name="文本框 36"/>
+          <p:cNvSpPr txBox="1"/>
+          <p:nvPr/>
+        </p:nvSpPr>
+        <p:spPr>
+          <a:xfrm>
+            <a:off x="5199194" y="4913657"/>
+            <a:ext cx="1281120" cy="369332"/>
+          </a:xfrm>
+          <a:prstGeom prst="rect">
+            <a:avLst/>
+          </a:prstGeom>
+          <a:noFill/>
+        </p:spPr>
+        <p:txBody>
+          <a:bodyPr wrap="none" rtlCol="0">
+            <a:spAutoFit/>
+          </a:bodyPr>
+          <a:lstStyle/>
+          <a:p>
+            <a:r>
+              <a:rPr lang="en-US" altLang="zh-CN" dirty="0" smtClean="0"/>
+              <a:t>6.</a:t>
+            </a:r>
+            <a:r>
+              <a:rPr lang="zh-CN" altLang="en-US" dirty="0" smtClean="0"/>
+              <a:t>申请资源</a:t>
+            </a:r>
+            <a:endParaRPr lang="zh-CN" altLang="en-US" dirty="0"/>
+          </a:p>
+        </p:txBody>
+      </p:sp>
+      <p:sp>
+        <p:nvSpPr>
+          <p:cNvPr id="38" name="文本框 37"/>
+          <p:cNvSpPr txBox="1"/>
+          <p:nvPr/>
+        </p:nvSpPr>
+        <p:spPr>
+          <a:xfrm>
+            <a:off x="5199194" y="5655363"/>
+            <a:ext cx="1281120" cy="369332"/>
+          </a:xfrm>
+          <a:prstGeom prst="rect">
+            <a:avLst/>
+          </a:prstGeom>
+          <a:noFill/>
+        </p:spPr>
+        <p:txBody>
+          <a:bodyPr wrap="none" rtlCol="0">
+            <a:spAutoFit/>
+          </a:bodyPr>
+          <a:lstStyle/>
+          <a:p>
+            <a:r>
+              <a:rPr lang="en-US" altLang="zh-CN" dirty="0" smtClean="0"/>
+              <a:t>7.</a:t>
+            </a:r>
+            <a:r>
+              <a:rPr lang="zh-CN" altLang="en-US" dirty="0" smtClean="0"/>
+              <a:t>开发资源</a:t>
+            </a:r>
+            <a:endParaRPr lang="zh-CN" altLang="en-US" dirty="0"/>
+          </a:p>
+        </p:txBody>
+      </p:sp>
+      <p:sp>
+        <p:nvSpPr>
+          <p:cNvPr id="40" name="文本框 39"/>
+          <p:cNvSpPr txBox="1"/>
+          <p:nvPr/>
+        </p:nvSpPr>
+        <p:spPr>
+          <a:xfrm>
+            <a:off x="496957" y="217077"/>
+            <a:ext cx="1295547" cy="369332"/>
+          </a:xfrm>
+          <a:prstGeom prst="rect">
+            <a:avLst/>
+          </a:prstGeom>
+          <a:solidFill>
+            <a:schemeClr val="accent2">
+              <a:lumMod val="20000"/>
+              <a:lumOff val="80000"/>
+            </a:schemeClr>
+          </a:solidFill>
+        </p:spPr>
+        <p:txBody>
+          <a:bodyPr wrap="none" rtlCol="0">
+            <a:spAutoFit/>
+          </a:bodyPr>
+          <a:lstStyle/>
+          <a:p>
+            <a:r>
+              <a:rPr lang="en-US" altLang="zh-CN" dirty="0" smtClean="0"/>
+              <a:t>OAuth</a:t>
+            </a:r>
+            <a:r>
+              <a:rPr lang="zh-CN" altLang="en-US" dirty="0" smtClean="0"/>
+              <a:t>原理</a:t>
+            </a:r>
+            <a:endParaRPr lang="zh-CN" altLang="en-US" dirty="0"/>
+          </a:p>
+        </p:txBody>
+      </p:sp>
+    </p:spTree>
+    <p:extLst>
+      <p:ext uri="{BB962C8B-B14F-4D97-AF65-F5344CB8AC3E}">
+        <p14:creationId xmlns:p14="http://schemas.microsoft.com/office/powerpoint/2010/main" val="1671813424"/>
+      </p:ext>
+    </p:extLst>
+  </p:cSld>
+  <p:clrMapOvr>
+    <a:masterClrMapping/>
+  </p:clrMapOvr>
+</p:sld>
+</file>
+
+<file path=ppt/slides/slide4.xml><?xml version="1.0" encoding="utf-8"?>
+<p:sld xmlns:a="http://schemas.openxmlformats.org/drawingml/2006/main" xmlns:r="http://schemas.openxmlformats.org/officeDocument/2006/relationships" xmlns:p="http://schemas.openxmlformats.org/presentationml/2006/main">
+  <p:cSld>
+    <p:spTree>
+      <p:nvGrpSpPr>
+        <p:cNvPr id="1" name=""/>
+        <p:cNvGrpSpPr/>
+        <p:nvPr/>
+      </p:nvGrpSpPr>
+      <p:grpSpPr>
+        <a:xfrm>
+          <a:off x="0" y="0"/>
+          <a:ext cx="0" cy="0"/>
+          <a:chOff x="0" y="0"/>
+          <a:chExt cx="0" cy="0"/>
+        </a:xfrm>
+      </p:grpSpPr>
+      <p:sp>
+        <p:nvSpPr>
+          <p:cNvPr id="4" name="矩形 3"/>
+          <p:cNvSpPr/>
+          <p:nvPr/>
+        </p:nvSpPr>
+        <p:spPr>
+          <a:xfrm>
+            <a:off x="854761" y="824943"/>
+            <a:ext cx="10475843" cy="5546034"/>
+          </a:xfrm>
+          <a:prstGeom prst="rect">
+            <a:avLst/>
+          </a:prstGeom>
+          <a:solidFill>
+            <a:schemeClr val="tx2">
+              <a:lumMod val="20000"/>
+              <a:lumOff val="80000"/>
+            </a:schemeClr>
+          </a:solidFill>
+        </p:spPr>
+        <p:style>
+          <a:lnRef idx="2">
+            <a:schemeClr val="accent1">
+              <a:shade val="50000"/>
+            </a:schemeClr>
+          </a:lnRef>
+          <a:fillRef idx="1">
+            <a:schemeClr val="accent1"/>
+          </a:fillRef>
+          <a:effectRef idx="0">
+            <a:schemeClr val="accent1"/>
+          </a:effectRef>
+          <a:fontRef idx="minor">
+            <a:schemeClr val="lt1"/>
+          </a:fontRef>
+        </p:style>
+        <p:txBody>
+          <a:bodyPr rtlCol="0" anchor="ctr"/>
+          <a:lstStyle/>
+          <a:p>
+            <a:pPr algn="ctr"/>
+            <a:endParaRPr lang="zh-CN" altLang="en-US" dirty="0"/>
+          </a:p>
+        </p:txBody>
+      </p:sp>
+      <p:sp>
+        <p:nvSpPr>
+          <p:cNvPr id="5" name="笑脸 4"/>
+          <p:cNvSpPr/>
+          <p:nvPr/>
+        </p:nvSpPr>
+        <p:spPr>
+          <a:xfrm>
+            <a:off x="2390357" y="1500805"/>
+            <a:ext cx="2126974" cy="1470991"/>
+          </a:xfrm>
+          <a:prstGeom prst="smileyFace">
+            <a:avLst/>
+          </a:prstGeom>
+          <a:solidFill>
+            <a:schemeClr val="accent1">
+              <a:lumMod val="40000"/>
+              <a:lumOff val="60000"/>
+            </a:schemeClr>
+          </a:solidFill>
+        </p:spPr>
+        <p:style>
+          <a:lnRef idx="2">
+            <a:schemeClr val="accent1">
+              <a:shade val="50000"/>
+            </a:schemeClr>
+          </a:lnRef>
+          <a:fillRef idx="1">
+            <a:schemeClr val="accent1"/>
+          </a:fillRef>
+          <a:effectRef idx="0">
+            <a:schemeClr val="accent1"/>
+          </a:effectRef>
+          <a:fontRef idx="minor">
+            <a:schemeClr val="lt1"/>
+          </a:fontRef>
+        </p:style>
+        <p:txBody>
+          <a:bodyPr rtlCol="0" anchor="ctr"/>
+          <a:lstStyle/>
+          <a:p>
+            <a:pPr algn="ctr"/>
+            <a:r>
+              <a:rPr lang="zh-CN" altLang="en-US" b="1" dirty="0" smtClean="0">
+                <a:solidFill>
+                  <a:schemeClr val="accent2">
+                    <a:lumMod val="75000"/>
+                  </a:schemeClr>
+                </a:solidFill>
+              </a:rPr>
+              <a:t>资源所有者</a:t>
+            </a:r>
+            <a:endParaRPr lang="en-US" altLang="zh-CN" b="1" dirty="0" smtClean="0">
+              <a:solidFill>
+                <a:schemeClr val="accent2">
+                  <a:lumMod val="75000"/>
+                </a:schemeClr>
+              </a:solidFill>
+            </a:endParaRPr>
+          </a:p>
+        </p:txBody>
+      </p:sp>
+      <p:sp>
+        <p:nvSpPr>
+          <p:cNvPr id="6" name="矩形 5"/>
+          <p:cNvSpPr/>
+          <p:nvPr/>
+        </p:nvSpPr>
+        <p:spPr>
+          <a:xfrm>
+            <a:off x="7056778" y="1451109"/>
+            <a:ext cx="4025347" cy="4820478"/>
+          </a:xfrm>
+          <a:prstGeom prst="rect">
+            <a:avLst/>
+          </a:prstGeom>
+          <a:solidFill>
+            <a:schemeClr val="bg2">
+              <a:lumMod val="90000"/>
+            </a:schemeClr>
+          </a:solidFill>
+          <a:ln>
+            <a:solidFill>
+              <a:schemeClr val="tx2">
+                <a:lumMod val="20000"/>
+                <a:lumOff val="80000"/>
+              </a:schemeClr>
+            </a:solidFill>
+          </a:ln>
+        </p:spPr>
+        <p:style>
+          <a:lnRef idx="2">
+            <a:schemeClr val="accent1">
+              <a:shade val="50000"/>
+            </a:schemeClr>
+          </a:lnRef>
+          <a:fillRef idx="1">
+            <a:schemeClr val="accent1"/>
+          </a:fillRef>
+          <a:effectRef idx="0">
+            <a:schemeClr val="accent1"/>
+          </a:effectRef>
+          <a:fontRef idx="minor">
+            <a:schemeClr val="lt1"/>
+          </a:fontRef>
+        </p:style>
+        <p:txBody>
+          <a:bodyPr rtlCol="0" anchor="t"/>
+          <a:lstStyle/>
+          <a:p>
+            <a:pPr algn="ctr"/>
+            <a:r>
+              <a:rPr lang="zh-CN" altLang="en-US" sz="2400" b="1" dirty="0" smtClean="0">
+                <a:solidFill>
+                  <a:schemeClr val="bg1"/>
+                </a:solidFill>
+                <a:latin typeface="Arial" panose="020B0604020202020204" pitchFamily="34" charset="0"/>
+                <a:cs typeface="Arial" panose="020B0604020202020204" pitchFamily="34" charset="0"/>
+              </a:rPr>
+              <a:t>服务提供商</a:t>
+            </a:r>
+            <a:endParaRPr lang="en-US" altLang="zh-CN" sz="2400" b="1" dirty="0" smtClean="0">
+              <a:solidFill>
+                <a:schemeClr val="bg1"/>
+              </a:solidFill>
+              <a:latin typeface="Arial" panose="020B0604020202020204" pitchFamily="34" charset="0"/>
+              <a:cs typeface="Arial" panose="020B0604020202020204" pitchFamily="34" charset="0"/>
+            </a:endParaRPr>
+          </a:p>
+          <a:p>
+            <a:pPr algn="ctr"/>
+            <a:r>
+              <a:rPr lang="en-US" altLang="zh-CN" sz="2400" b="1" dirty="0" smtClean="0">
+                <a:solidFill>
+                  <a:schemeClr val="bg1"/>
+                </a:solidFill>
+                <a:latin typeface="Arial" panose="020B0604020202020204" pitchFamily="34" charset="0"/>
+                <a:cs typeface="Arial" panose="020B0604020202020204" pitchFamily="34" charset="0"/>
+              </a:rPr>
+              <a:t>Provider</a:t>
+            </a:r>
+            <a:endParaRPr lang="zh-CN" altLang="en-US" sz="2400" b="1" dirty="0">
+              <a:solidFill>
+                <a:schemeClr val="bg1"/>
+              </a:solidFill>
+              <a:latin typeface="Arial" panose="020B0604020202020204" pitchFamily="34" charset="0"/>
+              <a:cs typeface="Arial" panose="020B0604020202020204" pitchFamily="34" charset="0"/>
+            </a:endParaRPr>
+          </a:p>
+        </p:txBody>
+      </p:sp>
+      <p:sp>
+        <p:nvSpPr>
+          <p:cNvPr id="7" name="矩形 6"/>
+          <p:cNvSpPr/>
+          <p:nvPr/>
+        </p:nvSpPr>
+        <p:spPr>
+          <a:xfrm>
+            <a:off x="1709525" y="4432848"/>
+            <a:ext cx="3448879" cy="1689652"/>
+          </a:xfrm>
+          <a:prstGeom prst="rect">
+            <a:avLst/>
+          </a:prstGeom>
+          <a:solidFill>
+            <a:schemeClr val="accent1">
+              <a:lumMod val="60000"/>
+              <a:lumOff val="40000"/>
+            </a:schemeClr>
+          </a:solidFill>
+        </p:spPr>
+        <p:style>
+          <a:lnRef idx="2">
+            <a:schemeClr val="accent1">
+              <a:shade val="50000"/>
+            </a:schemeClr>
+          </a:lnRef>
+          <a:fillRef idx="1">
+            <a:schemeClr val="accent1"/>
+          </a:fillRef>
+          <a:effectRef idx="0">
+            <a:schemeClr val="accent1"/>
+          </a:effectRef>
+          <a:fontRef idx="minor">
+            <a:schemeClr val="lt1"/>
+          </a:fontRef>
+        </p:style>
+        <p:txBody>
+          <a:bodyPr rtlCol="0" anchor="ctr"/>
+          <a:lstStyle/>
+          <a:p>
+            <a:pPr algn="ctr"/>
+            <a:r>
+              <a:rPr lang="zh-CN" altLang="en-US" dirty="0" smtClean="0"/>
+              <a:t>第三方应用</a:t>
+            </a:r>
+            <a:r>
+              <a:rPr lang="en-US" altLang="zh-CN" dirty="0" smtClean="0"/>
+              <a:t>Client</a:t>
+            </a:r>
+            <a:endParaRPr lang="zh-CN" altLang="en-US" dirty="0"/>
+          </a:p>
+        </p:txBody>
+      </p:sp>
+      <p:sp>
+        <p:nvSpPr>
+          <p:cNvPr id="8" name="矩形 7"/>
+          <p:cNvSpPr/>
+          <p:nvPr/>
+        </p:nvSpPr>
+        <p:spPr>
+          <a:xfrm>
+            <a:off x="7424526" y="2472005"/>
+            <a:ext cx="3299791" cy="1603033"/>
+          </a:xfrm>
+          <a:prstGeom prst="rect">
+            <a:avLst/>
+          </a:prstGeom>
+          <a:solidFill>
+            <a:schemeClr val="accent1">
+              <a:lumMod val="60000"/>
+              <a:lumOff val="40000"/>
+            </a:schemeClr>
+          </a:solidFill>
+        </p:spPr>
+        <p:style>
+          <a:lnRef idx="2">
+            <a:schemeClr val="accent1">
+              <a:shade val="50000"/>
+            </a:schemeClr>
+          </a:lnRef>
+          <a:fillRef idx="1">
+            <a:schemeClr val="accent1"/>
+          </a:fillRef>
+          <a:effectRef idx="0">
+            <a:schemeClr val="accent1"/>
+          </a:effectRef>
+          <a:fontRef idx="minor">
+            <a:schemeClr val="lt1"/>
+          </a:fontRef>
+        </p:style>
+        <p:txBody>
+          <a:bodyPr rtlCol="0" anchor="ctr"/>
+          <a:lstStyle/>
+          <a:p>
+            <a:pPr algn="ctr"/>
+            <a:r>
+              <a:rPr lang="zh-CN" altLang="en-US" dirty="0" smtClean="0"/>
+              <a:t>认证服务器</a:t>
+            </a:r>
+            <a:endParaRPr lang="en-US" altLang="zh-CN" dirty="0" smtClean="0"/>
+          </a:p>
+          <a:p>
+            <a:pPr algn="ctr"/>
+            <a:r>
+              <a:rPr lang="en-US" altLang="zh-CN" dirty="0" smtClean="0"/>
+              <a:t>Authorization Server</a:t>
+            </a:r>
+            <a:endParaRPr lang="zh-CN" altLang="en-US" dirty="0"/>
+          </a:p>
+        </p:txBody>
+      </p:sp>
+      <p:sp>
+        <p:nvSpPr>
+          <p:cNvPr id="9" name="矩形 8"/>
+          <p:cNvSpPr/>
+          <p:nvPr/>
+        </p:nvSpPr>
+        <p:spPr>
+          <a:xfrm>
+            <a:off x="7424526" y="4462665"/>
+            <a:ext cx="3299791" cy="1659835"/>
+          </a:xfrm>
+          <a:prstGeom prst="rect">
+            <a:avLst/>
+          </a:prstGeom>
+          <a:solidFill>
+            <a:schemeClr val="accent1">
+              <a:lumMod val="60000"/>
+              <a:lumOff val="40000"/>
+            </a:schemeClr>
+          </a:solidFill>
+        </p:spPr>
+        <p:style>
+          <a:lnRef idx="2">
+            <a:schemeClr val="accent1">
+              <a:shade val="50000"/>
+            </a:schemeClr>
+          </a:lnRef>
+          <a:fillRef idx="1">
+            <a:schemeClr val="accent1"/>
+          </a:fillRef>
+          <a:effectRef idx="0">
+            <a:schemeClr val="accent1"/>
+          </a:effectRef>
+          <a:fontRef idx="minor">
+            <a:schemeClr val="lt1"/>
+          </a:fontRef>
+        </p:style>
+        <p:txBody>
+          <a:bodyPr rtlCol="0" anchor="t"/>
+          <a:lstStyle/>
+          <a:p>
+            <a:pPr algn="ctr"/>
+            <a:r>
+              <a:rPr lang="zh-CN" altLang="en-US" dirty="0" smtClean="0"/>
+              <a:t>资源服务器</a:t>
+            </a:r>
+            <a:endParaRPr lang="en-US" altLang="zh-CN" dirty="0" smtClean="0"/>
+          </a:p>
+          <a:p>
+            <a:pPr algn="ctr"/>
+            <a:r>
+              <a:rPr lang="en-US" altLang="zh-CN" dirty="0" smtClean="0"/>
+              <a:t>Resource Server</a:t>
+            </a:r>
+            <a:endParaRPr lang="zh-CN" altLang="en-US" dirty="0"/>
+          </a:p>
+        </p:txBody>
+      </p:sp>
+      <p:cxnSp>
+        <p:nvCxnSpPr>
+          <p:cNvPr id="10" name="肘形连接符 9"/>
+          <p:cNvCxnSpPr>
+            <a:stCxn id="5" idx="2"/>
+            <a:endCxn id="7" idx="1"/>
+          </p:cNvCxnSpPr>
+          <p:nvPr/>
+        </p:nvCxnSpPr>
+        <p:spPr>
+          <a:xfrm rot="10800000" flipV="1">
+            <a:off x="1709525" y="2236300"/>
+            <a:ext cx="680832" cy="3041373"/>
+          </a:xfrm>
+          <a:prstGeom prst="bentConnector3">
+            <a:avLst>
+              <a:gd name="adj1" fmla="val 133577"/>
+            </a:avLst>
+          </a:prstGeom>
+          <a:ln>
+            <a:tailEnd type="triangle"/>
+          </a:ln>
+        </p:spPr>
+        <p:style>
+          <a:lnRef idx="1">
+            <a:schemeClr val="accent1"/>
+          </a:lnRef>
+          <a:fillRef idx="0">
+            <a:schemeClr val="accent1"/>
+          </a:fillRef>
+          <a:effectRef idx="0">
+            <a:schemeClr val="accent1"/>
+          </a:effectRef>
+          <a:fontRef idx="minor">
+            <a:schemeClr val="tx1"/>
+          </a:fontRef>
+        </p:style>
+      </p:cxnSp>
+      <p:sp>
+        <p:nvSpPr>
+          <p:cNvPr id="13" name="文本框 12"/>
+          <p:cNvSpPr txBox="1"/>
+          <p:nvPr/>
+        </p:nvSpPr>
+        <p:spPr>
+          <a:xfrm>
+            <a:off x="854761" y="3458813"/>
+            <a:ext cx="819455" cy="369332"/>
+          </a:xfrm>
+          <a:prstGeom prst="rect">
+            <a:avLst/>
+          </a:prstGeom>
+          <a:noFill/>
+        </p:spPr>
+        <p:txBody>
+          <a:bodyPr wrap="none" rtlCol="0">
+            <a:spAutoFit/>
+          </a:bodyPr>
+          <a:lstStyle/>
+          <a:p>
+            <a:r>
+              <a:rPr lang="en-US" altLang="zh-CN" dirty="0" smtClean="0"/>
+              <a:t>1.</a:t>
+            </a:r>
+            <a:r>
+              <a:rPr lang="zh-CN" altLang="en-US" dirty="0" smtClean="0"/>
+              <a:t>访问</a:t>
+            </a:r>
+            <a:endParaRPr lang="zh-CN" altLang="en-US" dirty="0"/>
+          </a:p>
+        </p:txBody>
+      </p:sp>
+      <p:sp>
+        <p:nvSpPr>
+          <p:cNvPr id="14" name="文本框 13"/>
+          <p:cNvSpPr txBox="1"/>
+          <p:nvPr/>
+        </p:nvSpPr>
+        <p:spPr>
+          <a:xfrm rot="20209976">
+            <a:off x="3909734" y="3196418"/>
+            <a:ext cx="2733879" cy="369332"/>
+          </a:xfrm>
+          <a:prstGeom prst="rect">
+            <a:avLst/>
+          </a:prstGeom>
+          <a:noFill/>
+        </p:spPr>
+        <p:txBody>
+          <a:bodyPr wrap="square" rtlCol="0">
+            <a:spAutoFit/>
+          </a:bodyPr>
+          <a:lstStyle/>
+          <a:p>
+            <a:r>
+              <a:rPr lang="en-US" altLang="zh-CN" dirty="0" smtClean="0"/>
+              <a:t>2.</a:t>
+            </a:r>
+            <a:r>
+              <a:rPr lang="zh-CN" altLang="en-US" dirty="0" smtClean="0"/>
+              <a:t>将用户导向认证服务器</a:t>
+            </a:r>
+            <a:endParaRPr lang="zh-CN" altLang="en-US" dirty="0"/>
+          </a:p>
+        </p:txBody>
+      </p:sp>
+      <p:sp>
+        <p:nvSpPr>
+          <p:cNvPr id="15" name="文本框 14"/>
+          <p:cNvSpPr txBox="1"/>
+          <p:nvPr/>
+        </p:nvSpPr>
+        <p:spPr>
+          <a:xfrm rot="854049">
+            <a:off x="5060197" y="1902284"/>
+            <a:ext cx="1292088" cy="369332"/>
+          </a:xfrm>
+          <a:prstGeom prst="rect">
+            <a:avLst/>
+          </a:prstGeom>
+          <a:noFill/>
+        </p:spPr>
+        <p:txBody>
+          <a:bodyPr wrap="square" rtlCol="0">
+            <a:spAutoFit/>
+          </a:bodyPr>
+          <a:lstStyle/>
+          <a:p>
+            <a:r>
+              <a:rPr lang="en-US" altLang="zh-CN" dirty="0" smtClean="0"/>
+              <a:t>3.</a:t>
+            </a:r>
+            <a:r>
+              <a:rPr lang="zh-CN" altLang="en-US" dirty="0" smtClean="0"/>
+              <a:t>同意授权</a:t>
+            </a:r>
+            <a:endParaRPr lang="zh-CN" altLang="en-US" dirty="0"/>
+          </a:p>
+        </p:txBody>
+      </p:sp>
+      <p:sp>
+        <p:nvSpPr>
+          <p:cNvPr id="16" name="矩形 15"/>
+          <p:cNvSpPr/>
+          <p:nvPr/>
+        </p:nvSpPr>
+        <p:spPr>
+          <a:xfrm>
+            <a:off x="8010934" y="5337309"/>
+            <a:ext cx="2196548" cy="526774"/>
+          </a:xfrm>
+          <a:prstGeom prst="rect">
+            <a:avLst/>
+          </a:prstGeom>
+        </p:spPr>
+        <p:style>
+          <a:lnRef idx="2">
+            <a:schemeClr val="accent1">
+              <a:shade val="50000"/>
+            </a:schemeClr>
+          </a:lnRef>
+          <a:fillRef idx="1">
+            <a:schemeClr val="accent1"/>
+          </a:fillRef>
+          <a:effectRef idx="0">
+            <a:schemeClr val="accent1"/>
+          </a:effectRef>
+          <a:fontRef idx="minor">
+            <a:schemeClr val="lt1"/>
+          </a:fontRef>
+        </p:style>
+        <p:txBody>
+          <a:bodyPr rtlCol="0" anchor="ctr"/>
+          <a:lstStyle/>
+          <a:p>
+            <a:pPr algn="ctr"/>
+            <a:r>
+              <a:rPr lang="zh-CN" altLang="en-US" dirty="0" smtClean="0"/>
+              <a:t>用户数据</a:t>
+            </a:r>
+            <a:endParaRPr lang="zh-CN" altLang="en-US" dirty="0"/>
+          </a:p>
+        </p:txBody>
+      </p:sp>
+      <p:sp>
+        <p:nvSpPr>
+          <p:cNvPr id="17" name="右箭头 16"/>
+          <p:cNvSpPr/>
+          <p:nvPr/>
+        </p:nvSpPr>
+        <p:spPr>
+          <a:xfrm>
+            <a:off x="5158404" y="5506273"/>
+            <a:ext cx="2266122" cy="173935"/>
+          </a:xfrm>
+          <a:prstGeom prst="rightArrow">
+            <a:avLst/>
+          </a:prstGeom>
+        </p:spPr>
+        <p:style>
+          <a:lnRef idx="2">
+            <a:schemeClr val="accent1">
+              <a:shade val="50000"/>
+            </a:schemeClr>
+          </a:lnRef>
+          <a:fillRef idx="1">
+            <a:schemeClr val="accent1"/>
+          </a:fillRef>
+          <a:effectRef idx="0">
+            <a:schemeClr val="accent1"/>
+          </a:effectRef>
+          <a:fontRef idx="minor">
+            <a:schemeClr val="lt1"/>
+          </a:fontRef>
+        </p:style>
+        <p:txBody>
+          <a:bodyPr rtlCol="0" anchor="ctr"/>
+          <a:lstStyle/>
+          <a:p>
+            <a:pPr algn="ctr"/>
+            <a:endParaRPr lang="zh-CN" altLang="en-US"/>
+          </a:p>
+        </p:txBody>
+      </p:sp>
+      <p:sp>
+        <p:nvSpPr>
+          <p:cNvPr id="18" name="左箭头 17"/>
+          <p:cNvSpPr/>
+          <p:nvPr/>
+        </p:nvSpPr>
+        <p:spPr>
+          <a:xfrm>
+            <a:off x="5158404" y="5814386"/>
+            <a:ext cx="2266122" cy="168964"/>
+          </a:xfrm>
+          <a:prstGeom prst="leftArrow">
+            <a:avLst/>
+          </a:prstGeom>
+        </p:spPr>
+        <p:style>
+          <a:lnRef idx="2">
+            <a:schemeClr val="accent1">
+              <a:shade val="50000"/>
+            </a:schemeClr>
+          </a:lnRef>
+          <a:fillRef idx="1">
+            <a:schemeClr val="accent1"/>
+          </a:fillRef>
+          <a:effectRef idx="0">
+            <a:schemeClr val="accent1"/>
+          </a:effectRef>
+          <a:fontRef idx="minor">
+            <a:schemeClr val="lt1"/>
+          </a:fontRef>
+        </p:style>
+        <p:txBody>
+          <a:bodyPr rtlCol="0" anchor="ctr"/>
+          <a:lstStyle/>
+          <a:p>
+            <a:pPr algn="ctr"/>
+            <a:endParaRPr lang="zh-CN" altLang="en-US"/>
+          </a:p>
+        </p:txBody>
+      </p:sp>
+      <p:sp>
+        <p:nvSpPr>
+          <p:cNvPr id="19" name="右箭头 18"/>
+          <p:cNvSpPr/>
+          <p:nvPr/>
+        </p:nvSpPr>
+        <p:spPr>
+          <a:xfrm rot="8881867">
+            <a:off x="5005551" y="4621835"/>
+            <a:ext cx="2532379" cy="148019"/>
+          </a:xfrm>
+          <a:prstGeom prst="rightArrow">
+            <a:avLst/>
+          </a:prstGeom>
+        </p:spPr>
+        <p:style>
+          <a:lnRef idx="2">
+            <a:schemeClr val="accent1">
+              <a:shade val="50000"/>
+            </a:schemeClr>
+          </a:lnRef>
+          <a:fillRef idx="1">
+            <a:schemeClr val="accent1"/>
+          </a:fillRef>
+          <a:effectRef idx="0">
+            <a:schemeClr val="accent1"/>
+          </a:effectRef>
+          <a:fontRef idx="minor">
+            <a:schemeClr val="lt1"/>
+          </a:fontRef>
+        </p:style>
+        <p:txBody>
+          <a:bodyPr rtlCol="0" anchor="ctr"/>
+          <a:lstStyle/>
+          <a:p>
+            <a:pPr algn="ctr"/>
+            <a:endParaRPr lang="zh-CN" altLang="en-US"/>
+          </a:p>
+        </p:txBody>
+      </p:sp>
+      <p:sp>
+        <p:nvSpPr>
+          <p:cNvPr id="20" name="右箭头 19"/>
+          <p:cNvSpPr/>
+          <p:nvPr/>
+        </p:nvSpPr>
+        <p:spPr>
+          <a:xfrm rot="19712871">
+            <a:off x="5039360" y="4277012"/>
+            <a:ext cx="2532379" cy="149805"/>
+          </a:xfrm>
+          <a:prstGeom prst="rightArrow">
+            <a:avLst/>
+          </a:prstGeom>
+        </p:spPr>
+        <p:style>
+          <a:lnRef idx="2">
+            <a:schemeClr val="accent1">
+              <a:shade val="50000"/>
+            </a:schemeClr>
+          </a:lnRef>
+          <a:fillRef idx="1">
+            <a:schemeClr val="accent1"/>
+          </a:fillRef>
+          <a:effectRef idx="0">
+            <a:schemeClr val="accent1"/>
+          </a:effectRef>
+          <a:fontRef idx="minor">
+            <a:schemeClr val="lt1"/>
+          </a:fontRef>
+        </p:style>
+        <p:txBody>
+          <a:bodyPr rtlCol="0" anchor="ctr"/>
+          <a:lstStyle/>
+          <a:p>
+            <a:pPr algn="ctr"/>
+            <a:endParaRPr lang="zh-CN" altLang="en-US"/>
+          </a:p>
+        </p:txBody>
+      </p:sp>
+      <p:sp>
+        <p:nvSpPr>
+          <p:cNvPr id="21" name="文本框 20"/>
+          <p:cNvSpPr txBox="1"/>
+          <p:nvPr/>
+        </p:nvSpPr>
+        <p:spPr>
+          <a:xfrm rot="19672111">
+            <a:off x="5463859" y="4040668"/>
+            <a:ext cx="1281120" cy="369332"/>
+          </a:xfrm>
+          <a:prstGeom prst="rect">
+            <a:avLst/>
+          </a:prstGeom>
+          <a:noFill/>
+        </p:spPr>
+        <p:txBody>
+          <a:bodyPr wrap="none" rtlCol="0">
+            <a:spAutoFit/>
+          </a:bodyPr>
+          <a:lstStyle/>
+          <a:p>
+            <a:r>
+              <a:rPr lang="en-US" altLang="zh-CN" dirty="0"/>
+              <a:t>5</a:t>
+            </a:r>
+            <a:r>
+              <a:rPr lang="en-US" altLang="zh-CN" dirty="0" smtClean="0"/>
+              <a:t>.</a:t>
+            </a:r>
+            <a:r>
+              <a:rPr lang="zh-CN" altLang="en-US" dirty="0" smtClean="0"/>
+              <a:t>申请令牌</a:t>
+            </a:r>
+            <a:endParaRPr lang="zh-CN" altLang="en-US" dirty="0"/>
+          </a:p>
+        </p:txBody>
+      </p:sp>
+      <p:sp>
+        <p:nvSpPr>
+          <p:cNvPr id="22" name="文本框 21"/>
+          <p:cNvSpPr txBox="1"/>
+          <p:nvPr/>
+        </p:nvSpPr>
+        <p:spPr>
+          <a:xfrm rot="19652937">
+            <a:off x="5804964" y="4671919"/>
+            <a:ext cx="1281120" cy="369332"/>
+          </a:xfrm>
+          <a:prstGeom prst="rect">
+            <a:avLst/>
+          </a:prstGeom>
+          <a:noFill/>
+        </p:spPr>
+        <p:txBody>
+          <a:bodyPr wrap="none" rtlCol="0">
+            <a:spAutoFit/>
+          </a:bodyPr>
+          <a:lstStyle/>
+          <a:p>
+            <a:r>
+              <a:rPr lang="en-US" altLang="zh-CN" dirty="0"/>
+              <a:t>6</a:t>
+            </a:r>
+            <a:r>
+              <a:rPr lang="en-US" altLang="zh-CN" dirty="0" smtClean="0"/>
+              <a:t>.</a:t>
+            </a:r>
+            <a:r>
+              <a:rPr lang="zh-CN" altLang="en-US" dirty="0" smtClean="0"/>
+              <a:t>发放令牌</a:t>
+            </a:r>
+            <a:endParaRPr lang="zh-CN" altLang="en-US" dirty="0"/>
+          </a:p>
+        </p:txBody>
+      </p:sp>
+      <p:sp>
+        <p:nvSpPr>
+          <p:cNvPr id="23" name="文本框 22"/>
+          <p:cNvSpPr txBox="1"/>
+          <p:nvPr/>
+        </p:nvSpPr>
+        <p:spPr>
+          <a:xfrm>
+            <a:off x="2530698" y="1131473"/>
+            <a:ext cx="1814920" cy="369332"/>
+          </a:xfrm>
+          <a:prstGeom prst="rect">
+            <a:avLst/>
+          </a:prstGeom>
+          <a:solidFill>
+            <a:schemeClr val="accent2">
+              <a:lumMod val="20000"/>
+              <a:lumOff val="80000"/>
+            </a:schemeClr>
+          </a:solidFill>
+        </p:spPr>
+        <p:txBody>
+          <a:bodyPr wrap="none" rtlCol="0">
+            <a:spAutoFit/>
+          </a:bodyPr>
+          <a:lstStyle/>
+          <a:p>
+            <a:r>
+              <a:rPr lang="en-US" altLang="zh-CN" dirty="0" smtClean="0"/>
+              <a:t>Resource Owner</a:t>
+            </a:r>
+            <a:endParaRPr lang="zh-CN" altLang="en-US" dirty="0"/>
+          </a:p>
+        </p:txBody>
+      </p:sp>
+      <p:sp>
+        <p:nvSpPr>
+          <p:cNvPr id="24" name="文本框 23"/>
+          <p:cNvSpPr txBox="1"/>
+          <p:nvPr/>
+        </p:nvSpPr>
+        <p:spPr>
+          <a:xfrm>
+            <a:off x="5556998" y="5241644"/>
+            <a:ext cx="1742785" cy="369332"/>
+          </a:xfrm>
+          <a:prstGeom prst="rect">
+            <a:avLst/>
+          </a:prstGeom>
+          <a:noFill/>
+        </p:spPr>
+        <p:txBody>
+          <a:bodyPr wrap="none" rtlCol="0">
+            <a:spAutoFit/>
+          </a:bodyPr>
+          <a:lstStyle/>
+          <a:p>
+            <a:r>
+              <a:rPr lang="en-US" altLang="zh-CN" dirty="0" smtClean="0"/>
+              <a:t>7.</a:t>
+            </a:r>
+            <a:r>
+              <a:rPr lang="zh-CN" altLang="en-US" dirty="0" smtClean="0"/>
+              <a:t>获取用户信息</a:t>
+            </a:r>
+            <a:endParaRPr lang="zh-CN" altLang="en-US" dirty="0"/>
+          </a:p>
+        </p:txBody>
+      </p:sp>
+      <p:sp>
+        <p:nvSpPr>
+          <p:cNvPr id="26" name="文本框 25"/>
+          <p:cNvSpPr txBox="1"/>
+          <p:nvPr/>
+        </p:nvSpPr>
+        <p:spPr>
+          <a:xfrm>
+            <a:off x="854761" y="455613"/>
+            <a:ext cx="2680542" cy="369332"/>
+          </a:xfrm>
+          <a:prstGeom prst="rect">
+            <a:avLst/>
+          </a:prstGeom>
+          <a:solidFill>
+            <a:schemeClr val="accent2">
+              <a:lumMod val="20000"/>
+              <a:lumOff val="80000"/>
+            </a:schemeClr>
+          </a:solidFill>
+        </p:spPr>
+        <p:txBody>
+          <a:bodyPr wrap="none" rtlCol="0">
+            <a:spAutoFit/>
+          </a:bodyPr>
+          <a:lstStyle/>
+          <a:p>
+            <a:r>
+              <a:rPr lang="en-US" altLang="zh-CN" dirty="0" smtClean="0"/>
+              <a:t>OAuth</a:t>
+            </a:r>
+            <a:r>
+              <a:rPr lang="zh-CN" altLang="en-US" dirty="0" smtClean="0"/>
+              <a:t>原理：</a:t>
+            </a:r>
+            <a:r>
+              <a:rPr lang="zh-CN" altLang="en-US" dirty="0"/>
+              <a:t>授权</a:t>
+            </a:r>
+            <a:r>
+              <a:rPr lang="zh-CN" altLang="en-US" dirty="0" smtClean="0"/>
+              <a:t>码模式</a:t>
+            </a:r>
+            <a:endParaRPr lang="zh-CN" altLang="en-US" dirty="0"/>
+          </a:p>
+        </p:txBody>
+      </p:sp>
+      <p:sp>
+        <p:nvSpPr>
+          <p:cNvPr id="29" name="右箭头 28"/>
+          <p:cNvSpPr/>
+          <p:nvPr/>
+        </p:nvSpPr>
+        <p:spPr>
+          <a:xfrm rot="837907">
+            <a:off x="4456206" y="2243343"/>
+            <a:ext cx="2958967" cy="144162"/>
+          </a:xfrm>
+          <a:prstGeom prst="rightArrow">
+            <a:avLst/>
+          </a:prstGeom>
+        </p:spPr>
+        <p:style>
+          <a:lnRef idx="2">
+            <a:schemeClr val="accent1">
+              <a:shade val="50000"/>
+            </a:schemeClr>
+          </a:lnRef>
+          <a:fillRef idx="1">
+            <a:schemeClr val="accent1"/>
+          </a:fillRef>
+          <a:effectRef idx="0">
+            <a:schemeClr val="accent1"/>
+          </a:effectRef>
+          <a:fontRef idx="minor">
+            <a:schemeClr val="lt1"/>
+          </a:fontRef>
+        </p:style>
+        <p:txBody>
+          <a:bodyPr rtlCol="0" anchor="ctr"/>
+          <a:lstStyle/>
+          <a:p>
+            <a:pPr algn="ctr"/>
+            <a:endParaRPr lang="zh-CN" altLang="en-US"/>
+          </a:p>
+        </p:txBody>
+      </p:sp>
+      <p:sp>
+        <p:nvSpPr>
+          <p:cNvPr id="31" name="右箭头 30"/>
+          <p:cNvSpPr/>
+          <p:nvPr/>
+        </p:nvSpPr>
+        <p:spPr>
+          <a:xfrm rot="20228711" flipV="1">
+            <a:off x="3375376" y="3493752"/>
+            <a:ext cx="4184722" cy="169657"/>
+          </a:xfrm>
+          <a:prstGeom prst="rightArrow">
+            <a:avLst/>
+          </a:prstGeom>
+        </p:spPr>
+        <p:style>
+          <a:lnRef idx="2">
+            <a:schemeClr val="accent1">
+              <a:shade val="50000"/>
+            </a:schemeClr>
+          </a:lnRef>
+          <a:fillRef idx="1">
+            <a:schemeClr val="accent1"/>
+          </a:fillRef>
+          <a:effectRef idx="0">
+            <a:schemeClr val="accent1"/>
+          </a:effectRef>
+          <a:fontRef idx="minor">
+            <a:schemeClr val="lt1"/>
+          </a:fontRef>
+        </p:style>
+        <p:txBody>
+          <a:bodyPr rtlCol="0" anchor="ctr"/>
+          <a:lstStyle/>
+          <a:p>
+            <a:pPr algn="ctr"/>
+            <a:endParaRPr lang="zh-CN" altLang="en-US"/>
+          </a:p>
+        </p:txBody>
+      </p:sp>
+      <p:sp>
+        <p:nvSpPr>
+          <p:cNvPr id="32" name="右箭头 31"/>
+          <p:cNvSpPr/>
+          <p:nvPr/>
+        </p:nvSpPr>
+        <p:spPr>
+          <a:xfrm rot="9381257">
+            <a:off x="4153743" y="3620542"/>
+            <a:ext cx="3415522" cy="177846"/>
+          </a:xfrm>
+          <a:prstGeom prst="rightArrow">
+            <a:avLst/>
+          </a:prstGeom>
+        </p:spPr>
+        <p:style>
+          <a:lnRef idx="2">
+            <a:schemeClr val="accent1">
+              <a:shade val="50000"/>
+            </a:schemeClr>
+          </a:lnRef>
+          <a:fillRef idx="1">
+            <a:schemeClr val="accent1"/>
+          </a:fillRef>
+          <a:effectRef idx="0">
+            <a:schemeClr val="accent1"/>
+          </a:effectRef>
+          <a:fontRef idx="minor">
+            <a:schemeClr val="lt1"/>
+          </a:fontRef>
+        </p:style>
+        <p:txBody>
+          <a:bodyPr rtlCol="0" anchor="ctr"/>
+          <a:lstStyle/>
+          <a:p>
+            <a:pPr algn="ctr"/>
+            <a:endParaRPr lang="zh-CN" altLang="en-US"/>
+          </a:p>
+        </p:txBody>
+      </p:sp>
+      <p:sp>
+        <p:nvSpPr>
+          <p:cNvPr id="33" name="文本框 32"/>
+          <p:cNvSpPr txBox="1"/>
+          <p:nvPr/>
+        </p:nvSpPr>
+        <p:spPr>
+          <a:xfrm rot="20164864">
+            <a:off x="4806351" y="3537920"/>
+            <a:ext cx="2730235" cy="369332"/>
+          </a:xfrm>
+          <a:prstGeom prst="rect">
+            <a:avLst/>
+          </a:prstGeom>
+          <a:noFill/>
+        </p:spPr>
+        <p:txBody>
+          <a:bodyPr wrap="none" rtlCol="0">
+            <a:spAutoFit/>
+          </a:bodyPr>
+          <a:lstStyle/>
+          <a:p>
+            <a:r>
+              <a:rPr lang="en-US" altLang="zh-CN" dirty="0"/>
+              <a:t>4</a:t>
+            </a:r>
+            <a:r>
+              <a:rPr lang="en-US" altLang="zh-CN" dirty="0" smtClean="0"/>
+              <a:t>.</a:t>
+            </a:r>
+            <a:r>
+              <a:rPr lang="zh-CN" altLang="en-US" dirty="0" smtClean="0"/>
+              <a:t>返回</a:t>
+            </a:r>
+            <a:r>
+              <a:rPr lang="en-US" altLang="zh-CN" dirty="0" smtClean="0"/>
+              <a:t>client</a:t>
+            </a:r>
+            <a:r>
+              <a:rPr lang="zh-CN" altLang="en-US" dirty="0" smtClean="0"/>
+              <a:t>并携带授权码</a:t>
+            </a:r>
+            <a:endParaRPr lang="zh-CN" altLang="en-US" dirty="0"/>
+          </a:p>
+        </p:txBody>
+      </p:sp>
+      <p:sp>
+        <p:nvSpPr>
+          <p:cNvPr id="35" name="文本框 34"/>
+          <p:cNvSpPr txBox="1"/>
+          <p:nvPr/>
+        </p:nvSpPr>
+        <p:spPr>
+          <a:xfrm>
+            <a:off x="1264488" y="6378991"/>
+            <a:ext cx="6304931" cy="369332"/>
+          </a:xfrm>
+          <a:prstGeom prst="rect">
+            <a:avLst/>
+          </a:prstGeom>
+          <a:noFill/>
+        </p:spPr>
+        <p:txBody>
+          <a:bodyPr wrap="none" rtlCol="0">
+            <a:spAutoFit/>
+          </a:bodyPr>
+          <a:lstStyle/>
+          <a:p>
+            <a:r>
+              <a:rPr lang="en-US" altLang="zh-CN" dirty="0" smtClean="0"/>
+              <a:t>8.</a:t>
+            </a:r>
+            <a:r>
+              <a:rPr lang="zh-CN" altLang="en-US" dirty="0" smtClean="0"/>
+              <a:t>根据用户信息构建</a:t>
+            </a:r>
+            <a:r>
+              <a:rPr lang="en-US" altLang="zh-CN" dirty="0" smtClean="0"/>
+              <a:t>Authentication</a:t>
+            </a:r>
+            <a:r>
+              <a:rPr lang="zh-CN" altLang="en-US" dirty="0" smtClean="0"/>
+              <a:t>并且放到</a:t>
+            </a:r>
+            <a:r>
+              <a:rPr lang="en-US" altLang="zh-CN" dirty="0" err="1" smtClean="0"/>
+              <a:t>SecurityContext</a:t>
+            </a:r>
+            <a:r>
+              <a:rPr lang="zh-CN" altLang="en-US" dirty="0"/>
+              <a:t>中</a:t>
+            </a:r>
+          </a:p>
+        </p:txBody>
+      </p:sp>
+    </p:spTree>
+    <p:extLst>
+      <p:ext uri="{BB962C8B-B14F-4D97-AF65-F5344CB8AC3E}">
+        <p14:creationId xmlns:p14="http://schemas.microsoft.com/office/powerpoint/2010/main" val="2259951126"/>
+      </p:ext>
+    </p:extLst>
+  </p:cSld>
+  <p:clrMapOvr>
+    <a:masterClrMapping/>
+  </p:clrMapOvr>
+</p:sld>
+</file>
+
+<file path=ppt/slides/slide5.xml><?xml version="1.0" encoding="utf-8"?>
+<p:sld xmlns:a="http://schemas.openxmlformats.org/drawingml/2006/main" xmlns:r="http://schemas.openxmlformats.org/officeDocument/2006/relationships" xmlns:p="http://schemas.openxmlformats.org/presentationml/2006/main">
+  <p:cSld>
+    <p:spTree>
+      <p:nvGrpSpPr>
+        <p:cNvPr id="1" name=""/>
+        <p:cNvGrpSpPr/>
+        <p:nvPr/>
+      </p:nvGrpSpPr>
+      <p:grpSpPr>
+        <a:xfrm>
+          <a:off x="0" y="0"/>
+          <a:ext cx="0" cy="0"/>
+          <a:chOff x="0" y="0"/>
+          <a:chExt cx="0" cy="0"/>
+        </a:xfrm>
+      </p:grpSpPr>
+      <p:sp>
+        <p:nvSpPr>
+          <p:cNvPr id="4" name="矩形 3"/>
+          <p:cNvSpPr/>
+          <p:nvPr/>
+        </p:nvSpPr>
+        <p:spPr>
+          <a:xfrm>
+            <a:off x="7474226" y="765314"/>
+            <a:ext cx="3478696" cy="5377070"/>
+          </a:xfrm>
+          <a:prstGeom prst="rect">
+            <a:avLst/>
+          </a:prstGeom>
+        </p:spPr>
+        <p:style>
+          <a:lnRef idx="2">
+            <a:schemeClr val="accent1">
+              <a:shade val="50000"/>
+            </a:schemeClr>
+          </a:lnRef>
+          <a:fillRef idx="1">
+            <a:schemeClr val="accent1"/>
+          </a:fillRef>
+          <a:effectRef idx="0">
+            <a:schemeClr val="accent1"/>
+          </a:effectRef>
+          <a:fontRef idx="minor">
+            <a:schemeClr val="lt1"/>
+          </a:fontRef>
+        </p:style>
+        <p:txBody>
+          <a:bodyPr rtlCol="0" anchor="t"/>
+          <a:lstStyle/>
+          <a:p>
+            <a:pPr algn="ctr"/>
+            <a:r>
+              <a:rPr lang="en-US" altLang="zh-CN" dirty="0" err="1" smtClean="0"/>
+              <a:t>ServiceProvider</a:t>
+            </a:r>
+            <a:endParaRPr lang="en-US" altLang="zh-CN" dirty="0" smtClean="0"/>
+          </a:p>
+          <a:p>
+            <a:pPr algn="ctr"/>
+            <a:r>
+              <a:rPr lang="en-US" altLang="zh-CN" dirty="0" smtClean="0"/>
+              <a:t>(AbstractOAuth2ServiceProvider)</a:t>
+            </a:r>
+            <a:endParaRPr lang="zh-CN" altLang="en-US" dirty="0"/>
+          </a:p>
+        </p:txBody>
+      </p:sp>
+      <p:sp>
+        <p:nvSpPr>
+          <p:cNvPr id="5" name="矩形 4"/>
+          <p:cNvSpPr/>
+          <p:nvPr/>
+        </p:nvSpPr>
+        <p:spPr>
+          <a:xfrm>
+            <a:off x="7712765" y="2017643"/>
+            <a:ext cx="2981739" cy="1510748"/>
+          </a:xfrm>
+          <a:prstGeom prst="rect">
+            <a:avLst/>
+          </a:prstGeom>
+          <a:solidFill>
+            <a:schemeClr val="accent1">
+              <a:lumMod val="60000"/>
+              <a:lumOff val="40000"/>
+            </a:schemeClr>
+          </a:solidFill>
+        </p:spPr>
+        <p:style>
+          <a:lnRef idx="2">
+            <a:schemeClr val="accent1">
+              <a:shade val="50000"/>
+            </a:schemeClr>
+          </a:lnRef>
+          <a:fillRef idx="1">
+            <a:schemeClr val="accent1"/>
+          </a:fillRef>
+          <a:effectRef idx="0">
+            <a:schemeClr val="accent1"/>
+          </a:effectRef>
+          <a:fontRef idx="minor">
+            <a:schemeClr val="lt1"/>
+          </a:fontRef>
+        </p:style>
+        <p:txBody>
+          <a:bodyPr rtlCol="0" anchor="ctr"/>
+          <a:lstStyle/>
+          <a:p>
+            <a:pPr algn="ctr"/>
+            <a:r>
+              <a:rPr lang="en-US" altLang="zh-CN" dirty="0" smtClean="0"/>
+              <a:t>OAuth2Operations</a:t>
+            </a:r>
+          </a:p>
+          <a:p>
+            <a:pPr algn="ctr"/>
+            <a:r>
+              <a:rPr lang="en-US" altLang="zh-CN" dirty="0" smtClean="0"/>
+              <a:t>(OAuth2Template)</a:t>
+            </a:r>
+            <a:endParaRPr lang="zh-CN" altLang="en-US" dirty="0"/>
+          </a:p>
+        </p:txBody>
+      </p:sp>
+      <p:sp>
+        <p:nvSpPr>
+          <p:cNvPr id="6" name="矩形 5"/>
+          <p:cNvSpPr/>
+          <p:nvPr/>
+        </p:nvSpPr>
+        <p:spPr>
+          <a:xfrm>
+            <a:off x="7712764" y="4080013"/>
+            <a:ext cx="2981739" cy="1510748"/>
+          </a:xfrm>
+          <a:prstGeom prst="rect">
+            <a:avLst/>
+          </a:prstGeom>
+          <a:solidFill>
+            <a:schemeClr val="accent1">
+              <a:lumMod val="60000"/>
+              <a:lumOff val="40000"/>
+            </a:schemeClr>
+          </a:solidFill>
+        </p:spPr>
+        <p:style>
+          <a:lnRef idx="2">
+            <a:schemeClr val="accent1">
+              <a:shade val="50000"/>
+            </a:schemeClr>
+          </a:lnRef>
+          <a:fillRef idx="1">
+            <a:schemeClr val="accent1"/>
+          </a:fillRef>
+          <a:effectRef idx="0">
+            <a:schemeClr val="accent1"/>
+          </a:effectRef>
+          <a:fontRef idx="minor">
+            <a:schemeClr val="lt1"/>
+          </a:fontRef>
+        </p:style>
+        <p:txBody>
+          <a:bodyPr rtlCol="0" anchor="ctr"/>
+          <a:lstStyle/>
+          <a:p>
+            <a:pPr algn="ctr"/>
+            <a:r>
+              <a:rPr lang="en-US" altLang="zh-CN" dirty="0" smtClean="0"/>
+              <a:t>API</a:t>
+            </a:r>
+          </a:p>
+          <a:p>
+            <a:pPr algn="ctr"/>
+            <a:r>
+              <a:rPr lang="en-US" altLang="zh-CN" dirty="0" smtClean="0"/>
+              <a:t>(AbstractOAuth2ApiBinding)</a:t>
+            </a:r>
+            <a:endParaRPr lang="zh-CN" altLang="en-US" dirty="0"/>
+          </a:p>
+        </p:txBody>
+      </p:sp>
+      <p:sp>
+        <p:nvSpPr>
+          <p:cNvPr id="8" name="矩形 7"/>
+          <p:cNvSpPr/>
+          <p:nvPr/>
+        </p:nvSpPr>
+        <p:spPr>
+          <a:xfrm>
+            <a:off x="3011558" y="3210338"/>
+            <a:ext cx="3558209" cy="2932045"/>
+          </a:xfrm>
+          <a:prstGeom prst="rect">
+            <a:avLst/>
+          </a:prstGeom>
+        </p:spPr>
+        <p:style>
+          <a:lnRef idx="2">
+            <a:schemeClr val="accent1">
+              <a:shade val="50000"/>
+            </a:schemeClr>
+          </a:lnRef>
+          <a:fillRef idx="1">
+            <a:schemeClr val="accent1"/>
+          </a:fillRef>
+          <a:effectRef idx="0">
+            <a:schemeClr val="accent1"/>
+          </a:effectRef>
+          <a:fontRef idx="minor">
+            <a:schemeClr val="lt1"/>
+          </a:fontRef>
+        </p:style>
+        <p:txBody>
+          <a:bodyPr rtlCol="0" anchor="t"/>
+          <a:lstStyle/>
+          <a:p>
+            <a:pPr algn="ctr"/>
+            <a:r>
+              <a:rPr lang="en-US" altLang="zh-CN" dirty="0" err="1" smtClean="0"/>
+              <a:t>ConnectionFactory</a:t>
+            </a:r>
+            <a:endParaRPr lang="en-US" altLang="zh-CN" dirty="0" smtClean="0"/>
+          </a:p>
+          <a:p>
+            <a:pPr algn="ctr"/>
+            <a:r>
+              <a:rPr lang="en-US" altLang="zh-CN" dirty="0" smtClean="0"/>
+              <a:t>(OAuth2ConnectionFactory)</a:t>
+            </a:r>
+            <a:endParaRPr lang="zh-CN" altLang="en-US" dirty="0"/>
+          </a:p>
+        </p:txBody>
+      </p:sp>
+      <p:sp>
+        <p:nvSpPr>
+          <p:cNvPr id="9" name="矩形 8"/>
+          <p:cNvSpPr/>
+          <p:nvPr/>
+        </p:nvSpPr>
+        <p:spPr>
+          <a:xfrm>
+            <a:off x="3011558" y="2017643"/>
+            <a:ext cx="3558209" cy="944218"/>
+          </a:xfrm>
+          <a:prstGeom prst="rect">
+            <a:avLst/>
+          </a:prstGeom>
+        </p:spPr>
+        <p:style>
+          <a:lnRef idx="2">
+            <a:schemeClr val="accent1">
+              <a:shade val="50000"/>
+            </a:schemeClr>
+          </a:lnRef>
+          <a:fillRef idx="1">
+            <a:schemeClr val="accent1"/>
+          </a:fillRef>
+          <a:effectRef idx="0">
+            <a:schemeClr val="accent1"/>
+          </a:effectRef>
+          <a:fontRef idx="minor">
+            <a:schemeClr val="lt1"/>
+          </a:fontRef>
+        </p:style>
+        <p:txBody>
+          <a:bodyPr rtlCol="0" anchor="ctr"/>
+          <a:lstStyle/>
+          <a:p>
+            <a:pPr algn="ctr"/>
+            <a:r>
+              <a:rPr lang="en-US" altLang="zh-CN" dirty="0" smtClean="0"/>
+              <a:t>Connection</a:t>
+            </a:r>
+          </a:p>
+          <a:p>
+            <a:pPr algn="ctr"/>
+            <a:r>
+              <a:rPr lang="en-US" altLang="zh-CN" dirty="0" smtClean="0"/>
+              <a:t>(OAuth2Connection)</a:t>
+            </a:r>
+            <a:endParaRPr lang="zh-CN" altLang="en-US" dirty="0"/>
+          </a:p>
+        </p:txBody>
+      </p:sp>
+      <p:sp>
+        <p:nvSpPr>
+          <p:cNvPr id="10" name="矩形 9"/>
+          <p:cNvSpPr/>
+          <p:nvPr/>
+        </p:nvSpPr>
+        <p:spPr>
+          <a:xfrm>
+            <a:off x="3011558" y="765314"/>
+            <a:ext cx="3558209" cy="1053547"/>
+          </a:xfrm>
+          <a:prstGeom prst="rect">
+            <a:avLst/>
+          </a:prstGeom>
+        </p:spPr>
+        <p:style>
+          <a:lnRef idx="2">
+            <a:schemeClr val="accent1">
+              <a:shade val="50000"/>
+            </a:schemeClr>
+          </a:lnRef>
+          <a:fillRef idx="1">
+            <a:schemeClr val="accent1"/>
+          </a:fillRef>
+          <a:effectRef idx="0">
+            <a:schemeClr val="accent1"/>
+          </a:effectRef>
+          <a:fontRef idx="minor">
+            <a:schemeClr val="lt1"/>
+          </a:fontRef>
+        </p:style>
+        <p:txBody>
+          <a:bodyPr rtlCol="0" anchor="ctr"/>
+          <a:lstStyle/>
+          <a:p>
+            <a:pPr algn="ctr"/>
+            <a:r>
+              <a:rPr lang="en-US" altLang="zh-CN" dirty="0" err="1" smtClean="0"/>
+              <a:t>UsersConnectionRepository</a:t>
+            </a:r>
+            <a:endParaRPr lang="en-US" altLang="zh-CN" dirty="0" smtClean="0"/>
+          </a:p>
+          <a:p>
+            <a:pPr algn="ctr"/>
+            <a:r>
+              <a:rPr lang="en-US" altLang="zh-CN" dirty="0" smtClean="0"/>
+              <a:t>(</a:t>
+            </a:r>
+            <a:r>
+              <a:rPr lang="en-US" altLang="zh-CN" dirty="0" err="1" smtClean="0"/>
+              <a:t>JdbcUsersConnectionRepository</a:t>
+            </a:r>
+            <a:r>
+              <a:rPr lang="en-US" altLang="zh-CN" dirty="0" smtClean="0"/>
+              <a:t>)</a:t>
+            </a:r>
+            <a:endParaRPr lang="zh-CN" altLang="en-US" dirty="0"/>
+          </a:p>
+        </p:txBody>
+      </p:sp>
+      <p:sp>
+        <p:nvSpPr>
+          <p:cNvPr id="11" name="矩形 10"/>
+          <p:cNvSpPr/>
+          <p:nvPr/>
+        </p:nvSpPr>
+        <p:spPr>
+          <a:xfrm>
+            <a:off x="3468758" y="4084984"/>
+            <a:ext cx="2792896" cy="824948"/>
+          </a:xfrm>
+          <a:prstGeom prst="rect">
+            <a:avLst/>
+          </a:prstGeom>
+          <a:solidFill>
+            <a:schemeClr val="accent1">
+              <a:lumMod val="60000"/>
+              <a:lumOff val="40000"/>
+            </a:schemeClr>
+          </a:solidFill>
+        </p:spPr>
+        <p:style>
+          <a:lnRef idx="2">
+            <a:schemeClr val="accent1">
+              <a:shade val="50000"/>
+            </a:schemeClr>
+          </a:lnRef>
+          <a:fillRef idx="1">
+            <a:schemeClr val="accent1"/>
+          </a:fillRef>
+          <a:effectRef idx="0">
+            <a:schemeClr val="accent1"/>
+          </a:effectRef>
+          <a:fontRef idx="minor">
+            <a:schemeClr val="lt1"/>
+          </a:fontRef>
+        </p:style>
+        <p:txBody>
+          <a:bodyPr rtlCol="0" anchor="ctr"/>
+          <a:lstStyle/>
+          <a:p>
+            <a:pPr algn="ctr"/>
+            <a:r>
+              <a:rPr lang="en-US" altLang="zh-CN" dirty="0" err="1" smtClean="0"/>
+              <a:t>ServiceProvider</a:t>
+            </a:r>
+            <a:endParaRPr lang="zh-CN" altLang="en-US" dirty="0"/>
+          </a:p>
+        </p:txBody>
+      </p:sp>
+      <p:sp>
+        <p:nvSpPr>
+          <p:cNvPr id="12" name="矩形 11"/>
+          <p:cNvSpPr/>
+          <p:nvPr/>
+        </p:nvSpPr>
+        <p:spPr>
+          <a:xfrm>
+            <a:off x="3468758" y="5118653"/>
+            <a:ext cx="2792896" cy="824948"/>
+          </a:xfrm>
+          <a:prstGeom prst="rect">
+            <a:avLst/>
+          </a:prstGeom>
+          <a:solidFill>
+            <a:schemeClr val="accent1">
+              <a:lumMod val="60000"/>
+              <a:lumOff val="40000"/>
+            </a:schemeClr>
+          </a:solidFill>
+        </p:spPr>
+        <p:style>
+          <a:lnRef idx="2">
+            <a:schemeClr val="accent1">
+              <a:shade val="50000"/>
+            </a:schemeClr>
+          </a:lnRef>
+          <a:fillRef idx="1">
+            <a:schemeClr val="accent1"/>
+          </a:fillRef>
+          <a:effectRef idx="0">
+            <a:schemeClr val="accent1"/>
+          </a:effectRef>
+          <a:fontRef idx="minor">
+            <a:schemeClr val="lt1"/>
+          </a:fontRef>
+        </p:style>
+        <p:txBody>
+          <a:bodyPr rtlCol="0" anchor="ctr"/>
+          <a:lstStyle/>
+          <a:p>
+            <a:pPr algn="ctr"/>
+            <a:r>
+              <a:rPr lang="en-US" altLang="zh-CN" dirty="0" err="1" smtClean="0"/>
+              <a:t>ApiAdapter</a:t>
+            </a:r>
+            <a:endParaRPr lang="zh-CN" altLang="en-US" dirty="0"/>
+          </a:p>
+        </p:txBody>
+      </p:sp>
+      <p:sp>
+        <p:nvSpPr>
+          <p:cNvPr id="13" name="流程图: 磁盘 12"/>
+          <p:cNvSpPr/>
+          <p:nvPr/>
+        </p:nvSpPr>
+        <p:spPr>
+          <a:xfrm>
+            <a:off x="159026" y="765314"/>
+            <a:ext cx="1858618" cy="1510748"/>
+          </a:xfrm>
+          <a:prstGeom prst="flowChartMagneticDisk">
+            <a:avLst/>
+          </a:prstGeom>
+        </p:spPr>
+        <p:style>
+          <a:lnRef idx="2">
+            <a:schemeClr val="accent1">
+              <a:shade val="50000"/>
+            </a:schemeClr>
+          </a:lnRef>
+          <a:fillRef idx="1">
+            <a:schemeClr val="accent1"/>
+          </a:fillRef>
+          <a:effectRef idx="0">
+            <a:schemeClr val="accent1"/>
+          </a:effectRef>
+          <a:fontRef idx="minor">
+            <a:schemeClr val="lt1"/>
+          </a:fontRef>
+        </p:style>
+        <p:txBody>
+          <a:bodyPr rtlCol="0" anchor="ctr"/>
+          <a:lstStyle/>
+          <a:p>
+            <a:pPr algn="ctr"/>
+            <a:r>
+              <a:rPr lang="en-US" altLang="zh-CN" dirty="0" smtClean="0"/>
+              <a:t>DB</a:t>
+            </a:r>
+          </a:p>
+          <a:p>
+            <a:pPr algn="ctr"/>
+            <a:r>
+              <a:rPr lang="en-US" altLang="zh-CN" dirty="0" err="1" smtClean="0"/>
+              <a:t>UserConnection</a:t>
+            </a:r>
+            <a:endParaRPr lang="zh-CN" altLang="en-US" dirty="0"/>
+          </a:p>
+        </p:txBody>
+      </p:sp>
+      <p:sp>
+        <p:nvSpPr>
+          <p:cNvPr id="14" name="左箭头 13"/>
+          <p:cNvSpPr/>
+          <p:nvPr/>
+        </p:nvSpPr>
+        <p:spPr>
+          <a:xfrm>
+            <a:off x="6500194" y="4778239"/>
+            <a:ext cx="1212570" cy="231084"/>
+          </a:xfrm>
+          <a:prstGeom prst="leftArrow">
+            <a:avLst/>
+          </a:prstGeom>
+          <a:solidFill>
+            <a:schemeClr val="accent2">
+              <a:lumMod val="75000"/>
+            </a:schemeClr>
+          </a:solidFill>
+        </p:spPr>
+        <p:style>
+          <a:lnRef idx="2">
+            <a:schemeClr val="accent1">
+              <a:shade val="50000"/>
+            </a:schemeClr>
+          </a:lnRef>
+          <a:fillRef idx="1">
+            <a:schemeClr val="accent1"/>
+          </a:fillRef>
+          <a:effectRef idx="0">
+            <a:schemeClr val="accent1"/>
+          </a:effectRef>
+          <a:fontRef idx="minor">
+            <a:schemeClr val="lt1"/>
+          </a:fontRef>
+        </p:style>
+        <p:txBody>
+          <a:bodyPr rtlCol="0" anchor="ctr"/>
+          <a:lstStyle/>
+          <a:p>
+            <a:pPr algn="ctr"/>
+            <a:endParaRPr lang="zh-CN" altLang="en-US"/>
+          </a:p>
+        </p:txBody>
+      </p:sp>
+    </p:spTree>
+    <p:extLst>
+      <p:ext uri="{BB962C8B-B14F-4D97-AF65-F5344CB8AC3E}">
+        <p14:creationId xmlns:p14="http://schemas.microsoft.com/office/powerpoint/2010/main" val="1661841777"/>
+      </p:ext>
+    </p:extLst>
+  </p:cSld>
+  <p:clrMapOvr>
+    <a:masterClrMapping/>
+  </p:clrMapOvr>
+</p:sld>
+</file>
+
 <file path=ppt/theme/theme1.xml><?xml version="1.0" encoding="utf-8"?>
 <a:theme xmlns:a="http://schemas.openxmlformats.org/drawingml/2006/main" name="Office 主题​​">
   <a:themeElements>

</xml_diff>

<commit_message>
Spring Social 绑定和解绑 & Spring Social Session集群的处理
</commit_message>
<xml_diff>
--- a/PhotoHelper.pptx
+++ b/PhotoHelper.pptx
@@ -10,6 +10,8 @@
     <p:sldId id="258" r:id="rId4"/>
     <p:sldId id="259" r:id="rId5"/>
     <p:sldId id="260" r:id="rId6"/>
+    <p:sldId id="261" r:id="rId7"/>
+    <p:sldId id="262" r:id="rId8"/>
   </p:sldIdLst>
   <p:sldSz cx="12192000" cy="6858000"/>
   <p:notesSz cx="6858000" cy="9144000"/>
@@ -7148,6 +7150,996 @@
 </p:sld>
 </file>
 
+<file path=ppt/slides/slide6.xml><?xml version="1.0" encoding="utf-8"?>
+<p:sld xmlns:a="http://schemas.openxmlformats.org/drawingml/2006/main" xmlns:r="http://schemas.openxmlformats.org/officeDocument/2006/relationships" xmlns:p="http://schemas.openxmlformats.org/presentationml/2006/main">
+  <p:cSld>
+    <p:spTree>
+      <p:nvGrpSpPr>
+        <p:cNvPr id="1" name=""/>
+        <p:cNvGrpSpPr/>
+        <p:nvPr/>
+      </p:nvGrpSpPr>
+      <p:grpSpPr>
+        <a:xfrm>
+          <a:off x="0" y="0"/>
+          <a:ext cx="0" cy="0"/>
+          <a:chOff x="0" y="0"/>
+          <a:chExt cx="0" cy="0"/>
+        </a:xfrm>
+      </p:grpSpPr>
+      <p:sp>
+        <p:nvSpPr>
+          <p:cNvPr id="15" name="矩形 14"/>
+          <p:cNvSpPr/>
+          <p:nvPr/>
+        </p:nvSpPr>
+        <p:spPr>
+          <a:xfrm>
+            <a:off x="1778000" y="702733"/>
+            <a:ext cx="7594600" cy="5359400"/>
+          </a:xfrm>
+          <a:prstGeom prst="rect">
+            <a:avLst/>
+          </a:prstGeom>
+          <a:solidFill>
+            <a:schemeClr val="accent1">
+              <a:lumMod val="20000"/>
+              <a:lumOff val="80000"/>
+            </a:schemeClr>
+          </a:solidFill>
+        </p:spPr>
+        <p:style>
+          <a:lnRef idx="2">
+            <a:schemeClr val="accent1">
+              <a:shade val="50000"/>
+            </a:schemeClr>
+          </a:lnRef>
+          <a:fillRef idx="1">
+            <a:schemeClr val="accent1"/>
+          </a:fillRef>
+          <a:effectRef idx="0">
+            <a:schemeClr val="accent1"/>
+          </a:effectRef>
+          <a:fontRef idx="minor">
+            <a:schemeClr val="lt1"/>
+          </a:fontRef>
+        </p:style>
+        <p:txBody>
+          <a:bodyPr rtlCol="0" anchor="ctr"/>
+          <a:lstStyle/>
+          <a:p>
+            <a:pPr algn="ctr"/>
+            <a:endParaRPr lang="zh-CN" altLang="en-US"/>
+          </a:p>
+        </p:txBody>
+      </p:sp>
+      <p:sp>
+        <p:nvSpPr>
+          <p:cNvPr id="4" name="笑脸 3"/>
+          <p:cNvSpPr/>
+          <p:nvPr/>
+        </p:nvSpPr>
+        <p:spPr>
+          <a:xfrm>
+            <a:off x="2235201" y="2777067"/>
+            <a:ext cx="914400" cy="914400"/>
+          </a:xfrm>
+          <a:prstGeom prst="smileyFace">
+            <a:avLst/>
+          </a:prstGeom>
+        </p:spPr>
+        <p:style>
+          <a:lnRef idx="2">
+            <a:schemeClr val="accent1">
+              <a:shade val="50000"/>
+            </a:schemeClr>
+          </a:lnRef>
+          <a:fillRef idx="1">
+            <a:schemeClr val="accent1"/>
+          </a:fillRef>
+          <a:effectRef idx="0">
+            <a:schemeClr val="accent1"/>
+          </a:effectRef>
+          <a:fontRef idx="minor">
+            <a:schemeClr val="lt1"/>
+          </a:fontRef>
+        </p:style>
+        <p:txBody>
+          <a:bodyPr rtlCol="0" anchor="ctr"/>
+          <a:lstStyle/>
+          <a:p>
+            <a:pPr algn="ctr"/>
+            <a:endParaRPr lang="zh-CN" altLang="en-US"/>
+          </a:p>
+        </p:txBody>
+      </p:sp>
+      <p:sp>
+        <p:nvSpPr>
+          <p:cNvPr id="5" name="矩形 4"/>
+          <p:cNvSpPr/>
+          <p:nvPr/>
+        </p:nvSpPr>
+        <p:spPr>
+          <a:xfrm>
+            <a:off x="6341534" y="1210733"/>
+            <a:ext cx="2463800" cy="1676400"/>
+          </a:xfrm>
+          <a:prstGeom prst="rect">
+            <a:avLst/>
+          </a:prstGeom>
+        </p:spPr>
+        <p:style>
+          <a:lnRef idx="2">
+            <a:schemeClr val="accent1">
+              <a:shade val="50000"/>
+            </a:schemeClr>
+          </a:lnRef>
+          <a:fillRef idx="1">
+            <a:schemeClr val="accent1"/>
+          </a:fillRef>
+          <a:effectRef idx="0">
+            <a:schemeClr val="accent1"/>
+          </a:effectRef>
+          <a:fontRef idx="minor">
+            <a:schemeClr val="lt1"/>
+          </a:fontRef>
+        </p:style>
+        <p:txBody>
+          <a:bodyPr rtlCol="0" anchor="t"/>
+          <a:lstStyle/>
+          <a:p>
+            <a:pPr algn="ctr"/>
+            <a:r>
+              <a:rPr lang="en-US" altLang="zh-CN" dirty="0" smtClean="0"/>
+              <a:t>Server01</a:t>
+            </a:r>
+            <a:endParaRPr lang="zh-CN" altLang="en-US" dirty="0"/>
+          </a:p>
+        </p:txBody>
+      </p:sp>
+      <p:sp>
+        <p:nvSpPr>
+          <p:cNvPr id="6" name="矩形 5"/>
+          <p:cNvSpPr/>
+          <p:nvPr/>
+        </p:nvSpPr>
+        <p:spPr>
+          <a:xfrm>
+            <a:off x="6341534" y="3818467"/>
+            <a:ext cx="2463800" cy="1676400"/>
+          </a:xfrm>
+          <a:prstGeom prst="rect">
+            <a:avLst/>
+          </a:prstGeom>
+        </p:spPr>
+        <p:style>
+          <a:lnRef idx="2">
+            <a:schemeClr val="accent1">
+              <a:shade val="50000"/>
+            </a:schemeClr>
+          </a:lnRef>
+          <a:fillRef idx="1">
+            <a:schemeClr val="accent1"/>
+          </a:fillRef>
+          <a:effectRef idx="0">
+            <a:schemeClr val="accent1"/>
+          </a:effectRef>
+          <a:fontRef idx="minor">
+            <a:schemeClr val="lt1"/>
+          </a:fontRef>
+        </p:style>
+        <p:txBody>
+          <a:bodyPr rtlCol="0" anchor="t"/>
+          <a:lstStyle/>
+          <a:p>
+            <a:pPr algn="ctr"/>
+            <a:r>
+              <a:rPr lang="en-US" altLang="zh-CN" dirty="0" smtClean="0"/>
+              <a:t>Server02</a:t>
+            </a:r>
+            <a:endParaRPr lang="zh-CN" altLang="en-US" dirty="0"/>
+          </a:p>
+        </p:txBody>
+      </p:sp>
+      <p:sp>
+        <p:nvSpPr>
+          <p:cNvPr id="8" name="圆角矩形 7"/>
+          <p:cNvSpPr/>
+          <p:nvPr/>
+        </p:nvSpPr>
+        <p:spPr>
+          <a:xfrm>
+            <a:off x="7035801" y="1896533"/>
+            <a:ext cx="1168400" cy="660400"/>
+          </a:xfrm>
+          <a:prstGeom prst="roundRect">
+            <a:avLst/>
+          </a:prstGeom>
+          <a:solidFill>
+            <a:schemeClr val="accent2">
+              <a:lumMod val="40000"/>
+              <a:lumOff val="60000"/>
+            </a:schemeClr>
+          </a:solidFill>
+        </p:spPr>
+        <p:style>
+          <a:lnRef idx="2">
+            <a:schemeClr val="accent1">
+              <a:shade val="50000"/>
+            </a:schemeClr>
+          </a:lnRef>
+          <a:fillRef idx="1">
+            <a:schemeClr val="accent1"/>
+          </a:fillRef>
+          <a:effectRef idx="0">
+            <a:schemeClr val="accent1"/>
+          </a:effectRef>
+          <a:fontRef idx="minor">
+            <a:schemeClr val="lt1"/>
+          </a:fontRef>
+        </p:style>
+        <p:txBody>
+          <a:bodyPr rtlCol="0" anchor="ctr"/>
+          <a:lstStyle/>
+          <a:p>
+            <a:pPr algn="ctr"/>
+            <a:r>
+              <a:rPr lang="en-US" altLang="zh-CN" dirty="0" smtClean="0"/>
+              <a:t>Session</a:t>
+            </a:r>
+            <a:endParaRPr lang="zh-CN" altLang="en-US" dirty="0"/>
+          </a:p>
+        </p:txBody>
+      </p:sp>
+      <p:sp>
+        <p:nvSpPr>
+          <p:cNvPr id="9" name="圆角矩形 8"/>
+          <p:cNvSpPr/>
+          <p:nvPr/>
+        </p:nvSpPr>
+        <p:spPr>
+          <a:xfrm>
+            <a:off x="7048501" y="4326467"/>
+            <a:ext cx="1168400" cy="660400"/>
+          </a:xfrm>
+          <a:prstGeom prst="roundRect">
+            <a:avLst/>
+          </a:prstGeom>
+          <a:solidFill>
+            <a:schemeClr val="accent2">
+              <a:lumMod val="40000"/>
+              <a:lumOff val="60000"/>
+            </a:schemeClr>
+          </a:solidFill>
+        </p:spPr>
+        <p:style>
+          <a:lnRef idx="2">
+            <a:schemeClr val="accent1">
+              <a:shade val="50000"/>
+            </a:schemeClr>
+          </a:lnRef>
+          <a:fillRef idx="1">
+            <a:schemeClr val="accent1"/>
+          </a:fillRef>
+          <a:effectRef idx="0">
+            <a:schemeClr val="accent1"/>
+          </a:effectRef>
+          <a:fontRef idx="minor">
+            <a:schemeClr val="lt1"/>
+          </a:fontRef>
+        </p:style>
+        <p:txBody>
+          <a:bodyPr rtlCol="0" anchor="ctr"/>
+          <a:lstStyle/>
+          <a:p>
+            <a:pPr algn="ctr"/>
+            <a:r>
+              <a:rPr lang="en-US" altLang="zh-CN" dirty="0" smtClean="0"/>
+              <a:t>Session</a:t>
+            </a:r>
+            <a:endParaRPr lang="zh-CN" altLang="en-US" dirty="0"/>
+          </a:p>
+        </p:txBody>
+      </p:sp>
+      <p:sp>
+        <p:nvSpPr>
+          <p:cNvPr id="10" name="圆角矩形 9"/>
+          <p:cNvSpPr/>
+          <p:nvPr/>
+        </p:nvSpPr>
+        <p:spPr>
+          <a:xfrm>
+            <a:off x="3860801" y="2908300"/>
+            <a:ext cx="1549400" cy="651934"/>
+          </a:xfrm>
+          <a:prstGeom prst="roundRect">
+            <a:avLst/>
+          </a:prstGeom>
+        </p:spPr>
+        <p:style>
+          <a:lnRef idx="2">
+            <a:schemeClr val="accent1">
+              <a:shade val="50000"/>
+            </a:schemeClr>
+          </a:lnRef>
+          <a:fillRef idx="1">
+            <a:schemeClr val="accent1"/>
+          </a:fillRef>
+          <a:effectRef idx="0">
+            <a:schemeClr val="accent1"/>
+          </a:effectRef>
+          <a:fontRef idx="minor">
+            <a:schemeClr val="lt1"/>
+          </a:fontRef>
+        </p:style>
+        <p:txBody>
+          <a:bodyPr rtlCol="0" anchor="ctr"/>
+          <a:lstStyle/>
+          <a:p>
+            <a:pPr algn="ctr"/>
+            <a:r>
+              <a:rPr lang="en-US" altLang="zh-CN" dirty="0" smtClean="0"/>
+              <a:t>Nginx</a:t>
+            </a:r>
+            <a:endParaRPr lang="zh-CN" altLang="en-US" dirty="0"/>
+          </a:p>
+        </p:txBody>
+      </p:sp>
+      <p:sp>
+        <p:nvSpPr>
+          <p:cNvPr id="11" name="右箭头 10"/>
+          <p:cNvSpPr/>
+          <p:nvPr/>
+        </p:nvSpPr>
+        <p:spPr>
+          <a:xfrm>
+            <a:off x="3149601" y="3174998"/>
+            <a:ext cx="711200" cy="152400"/>
+          </a:xfrm>
+          <a:prstGeom prst="rightArrow">
+            <a:avLst/>
+          </a:prstGeom>
+        </p:spPr>
+        <p:style>
+          <a:lnRef idx="2">
+            <a:schemeClr val="accent1">
+              <a:shade val="50000"/>
+            </a:schemeClr>
+          </a:lnRef>
+          <a:fillRef idx="1">
+            <a:schemeClr val="accent1"/>
+          </a:fillRef>
+          <a:effectRef idx="0">
+            <a:schemeClr val="accent1"/>
+          </a:effectRef>
+          <a:fontRef idx="minor">
+            <a:schemeClr val="lt1"/>
+          </a:fontRef>
+        </p:style>
+        <p:txBody>
+          <a:bodyPr rtlCol="0" anchor="ctr"/>
+          <a:lstStyle/>
+          <a:p>
+            <a:pPr algn="ctr"/>
+            <a:endParaRPr lang="zh-CN" altLang="en-US"/>
+          </a:p>
+        </p:txBody>
+      </p:sp>
+      <p:sp>
+        <p:nvSpPr>
+          <p:cNvPr id="12" name="右箭头 11"/>
+          <p:cNvSpPr/>
+          <p:nvPr/>
+        </p:nvSpPr>
+        <p:spPr>
+          <a:xfrm rot="19412054">
+            <a:off x="4863677" y="2290906"/>
+            <a:ext cx="1591732" cy="211666"/>
+          </a:xfrm>
+          <a:prstGeom prst="rightArrow">
+            <a:avLst/>
+          </a:prstGeom>
+        </p:spPr>
+        <p:style>
+          <a:lnRef idx="2">
+            <a:schemeClr val="accent1">
+              <a:shade val="50000"/>
+            </a:schemeClr>
+          </a:lnRef>
+          <a:fillRef idx="1">
+            <a:schemeClr val="accent1"/>
+          </a:fillRef>
+          <a:effectRef idx="0">
+            <a:schemeClr val="accent1"/>
+          </a:effectRef>
+          <a:fontRef idx="minor">
+            <a:schemeClr val="lt1"/>
+          </a:fontRef>
+        </p:style>
+        <p:txBody>
+          <a:bodyPr rtlCol="0" anchor="ctr"/>
+          <a:lstStyle/>
+          <a:p>
+            <a:pPr algn="ctr"/>
+            <a:endParaRPr lang="zh-CN" altLang="en-US"/>
+          </a:p>
+        </p:txBody>
+      </p:sp>
+      <p:sp>
+        <p:nvSpPr>
+          <p:cNvPr id="14" name="右箭头 13"/>
+          <p:cNvSpPr/>
+          <p:nvPr/>
+        </p:nvSpPr>
+        <p:spPr>
+          <a:xfrm rot="2574232">
+            <a:off x="4914483" y="4024560"/>
+            <a:ext cx="1591732" cy="211666"/>
+          </a:xfrm>
+          <a:prstGeom prst="rightArrow">
+            <a:avLst/>
+          </a:prstGeom>
+        </p:spPr>
+        <p:style>
+          <a:lnRef idx="2">
+            <a:schemeClr val="accent1">
+              <a:shade val="50000"/>
+            </a:schemeClr>
+          </a:lnRef>
+          <a:fillRef idx="1">
+            <a:schemeClr val="accent1"/>
+          </a:fillRef>
+          <a:effectRef idx="0">
+            <a:schemeClr val="accent1"/>
+          </a:effectRef>
+          <a:fontRef idx="minor">
+            <a:schemeClr val="lt1"/>
+          </a:fontRef>
+        </p:style>
+        <p:txBody>
+          <a:bodyPr rtlCol="0" anchor="ctr"/>
+          <a:lstStyle/>
+          <a:p>
+            <a:pPr algn="ctr"/>
+            <a:endParaRPr lang="zh-CN" altLang="en-US"/>
+          </a:p>
+        </p:txBody>
+      </p:sp>
+    </p:spTree>
+    <p:extLst>
+      <p:ext uri="{BB962C8B-B14F-4D97-AF65-F5344CB8AC3E}">
+        <p14:creationId xmlns:p14="http://schemas.microsoft.com/office/powerpoint/2010/main" val="840996324"/>
+      </p:ext>
+    </p:extLst>
+  </p:cSld>
+  <p:clrMapOvr>
+    <a:masterClrMapping/>
+  </p:clrMapOvr>
+</p:sld>
+</file>
+
+<file path=ppt/slides/slide7.xml><?xml version="1.0" encoding="utf-8"?>
+<p:sld xmlns:a="http://schemas.openxmlformats.org/drawingml/2006/main" xmlns:r="http://schemas.openxmlformats.org/officeDocument/2006/relationships" xmlns:p="http://schemas.openxmlformats.org/presentationml/2006/main">
+  <p:cSld>
+    <p:spTree>
+      <p:nvGrpSpPr>
+        <p:cNvPr id="1" name=""/>
+        <p:cNvGrpSpPr/>
+        <p:nvPr/>
+      </p:nvGrpSpPr>
+      <p:grpSpPr>
+        <a:xfrm>
+          <a:off x="0" y="0"/>
+          <a:ext cx="0" cy="0"/>
+          <a:chOff x="0" y="0"/>
+          <a:chExt cx="0" cy="0"/>
+        </a:xfrm>
+      </p:grpSpPr>
+      <p:sp>
+        <p:nvSpPr>
+          <p:cNvPr id="4" name="矩形 3"/>
+          <p:cNvSpPr/>
+          <p:nvPr/>
+        </p:nvSpPr>
+        <p:spPr>
+          <a:xfrm>
+            <a:off x="203197" y="702733"/>
+            <a:ext cx="11353803" cy="5359400"/>
+          </a:xfrm>
+          <a:prstGeom prst="rect">
+            <a:avLst/>
+          </a:prstGeom>
+          <a:solidFill>
+            <a:schemeClr val="accent1">
+              <a:lumMod val="20000"/>
+              <a:lumOff val="80000"/>
+            </a:schemeClr>
+          </a:solidFill>
+        </p:spPr>
+        <p:style>
+          <a:lnRef idx="2">
+            <a:schemeClr val="accent1">
+              <a:shade val="50000"/>
+            </a:schemeClr>
+          </a:lnRef>
+          <a:fillRef idx="1">
+            <a:schemeClr val="accent1"/>
+          </a:fillRef>
+          <a:effectRef idx="0">
+            <a:schemeClr val="accent1"/>
+          </a:effectRef>
+          <a:fontRef idx="minor">
+            <a:schemeClr val="lt1"/>
+          </a:fontRef>
+        </p:style>
+        <p:txBody>
+          <a:bodyPr rtlCol="0" anchor="ctr"/>
+          <a:lstStyle/>
+          <a:p>
+            <a:pPr algn="ctr"/>
+            <a:endParaRPr lang="zh-CN" altLang="en-US"/>
+          </a:p>
+        </p:txBody>
+      </p:sp>
+      <p:sp>
+        <p:nvSpPr>
+          <p:cNvPr id="5" name="笑脸 4"/>
+          <p:cNvSpPr/>
+          <p:nvPr/>
+        </p:nvSpPr>
+        <p:spPr>
+          <a:xfrm>
+            <a:off x="660399" y="2777067"/>
+            <a:ext cx="914400" cy="914400"/>
+          </a:xfrm>
+          <a:prstGeom prst="smileyFace">
+            <a:avLst/>
+          </a:prstGeom>
+        </p:spPr>
+        <p:style>
+          <a:lnRef idx="2">
+            <a:schemeClr val="accent1">
+              <a:shade val="50000"/>
+            </a:schemeClr>
+          </a:lnRef>
+          <a:fillRef idx="1">
+            <a:schemeClr val="accent1"/>
+          </a:fillRef>
+          <a:effectRef idx="0">
+            <a:schemeClr val="accent1"/>
+          </a:effectRef>
+          <a:fontRef idx="minor">
+            <a:schemeClr val="lt1"/>
+          </a:fontRef>
+        </p:style>
+        <p:txBody>
+          <a:bodyPr rtlCol="0" anchor="ctr"/>
+          <a:lstStyle/>
+          <a:p>
+            <a:pPr algn="ctr"/>
+            <a:endParaRPr lang="zh-CN" altLang="en-US"/>
+          </a:p>
+        </p:txBody>
+      </p:sp>
+      <p:sp>
+        <p:nvSpPr>
+          <p:cNvPr id="6" name="矩形 5"/>
+          <p:cNvSpPr/>
+          <p:nvPr/>
+        </p:nvSpPr>
+        <p:spPr>
+          <a:xfrm>
+            <a:off x="4766732" y="1210733"/>
+            <a:ext cx="2463800" cy="1676400"/>
+          </a:xfrm>
+          <a:prstGeom prst="rect">
+            <a:avLst/>
+          </a:prstGeom>
+        </p:spPr>
+        <p:style>
+          <a:lnRef idx="2">
+            <a:schemeClr val="accent1">
+              <a:shade val="50000"/>
+            </a:schemeClr>
+          </a:lnRef>
+          <a:fillRef idx="1">
+            <a:schemeClr val="accent1"/>
+          </a:fillRef>
+          <a:effectRef idx="0">
+            <a:schemeClr val="accent1"/>
+          </a:effectRef>
+          <a:fontRef idx="minor">
+            <a:schemeClr val="lt1"/>
+          </a:fontRef>
+        </p:style>
+        <p:txBody>
+          <a:bodyPr rtlCol="0" anchor="ctr"/>
+          <a:lstStyle/>
+          <a:p>
+            <a:pPr algn="ctr"/>
+            <a:r>
+              <a:rPr lang="en-US" altLang="zh-CN" dirty="0" smtClean="0"/>
+              <a:t>Server01</a:t>
+            </a:r>
+            <a:endParaRPr lang="zh-CN" altLang="en-US" dirty="0"/>
+          </a:p>
+        </p:txBody>
+      </p:sp>
+      <p:sp>
+        <p:nvSpPr>
+          <p:cNvPr id="7" name="矩形 6"/>
+          <p:cNvSpPr/>
+          <p:nvPr/>
+        </p:nvSpPr>
+        <p:spPr>
+          <a:xfrm>
+            <a:off x="4766732" y="3818467"/>
+            <a:ext cx="2463800" cy="1676400"/>
+          </a:xfrm>
+          <a:prstGeom prst="rect">
+            <a:avLst/>
+          </a:prstGeom>
+        </p:spPr>
+        <p:style>
+          <a:lnRef idx="2">
+            <a:schemeClr val="accent1">
+              <a:shade val="50000"/>
+            </a:schemeClr>
+          </a:lnRef>
+          <a:fillRef idx="1">
+            <a:schemeClr val="accent1"/>
+          </a:fillRef>
+          <a:effectRef idx="0">
+            <a:schemeClr val="accent1"/>
+          </a:effectRef>
+          <a:fontRef idx="minor">
+            <a:schemeClr val="lt1"/>
+          </a:fontRef>
+        </p:style>
+        <p:txBody>
+          <a:bodyPr rtlCol="0" anchor="ctr"/>
+          <a:lstStyle/>
+          <a:p>
+            <a:pPr algn="ctr"/>
+            <a:r>
+              <a:rPr lang="en-US" altLang="zh-CN" dirty="0" smtClean="0"/>
+              <a:t>Server02</a:t>
+            </a:r>
+            <a:endParaRPr lang="zh-CN" altLang="en-US" dirty="0"/>
+          </a:p>
+        </p:txBody>
+      </p:sp>
+      <p:sp>
+        <p:nvSpPr>
+          <p:cNvPr id="10" name="圆角矩形 9"/>
+          <p:cNvSpPr/>
+          <p:nvPr/>
+        </p:nvSpPr>
+        <p:spPr>
+          <a:xfrm>
+            <a:off x="2285999" y="2908300"/>
+            <a:ext cx="1549400" cy="651934"/>
+          </a:xfrm>
+          <a:prstGeom prst="roundRect">
+            <a:avLst/>
+          </a:prstGeom>
+        </p:spPr>
+        <p:style>
+          <a:lnRef idx="2">
+            <a:schemeClr val="accent1">
+              <a:shade val="50000"/>
+            </a:schemeClr>
+          </a:lnRef>
+          <a:fillRef idx="1">
+            <a:schemeClr val="accent1"/>
+          </a:fillRef>
+          <a:effectRef idx="0">
+            <a:schemeClr val="accent1"/>
+          </a:effectRef>
+          <a:fontRef idx="minor">
+            <a:schemeClr val="lt1"/>
+          </a:fontRef>
+        </p:style>
+        <p:txBody>
+          <a:bodyPr rtlCol="0" anchor="ctr"/>
+          <a:lstStyle/>
+          <a:p>
+            <a:pPr algn="ctr"/>
+            <a:r>
+              <a:rPr lang="en-US" altLang="zh-CN" dirty="0" smtClean="0"/>
+              <a:t>Nginx</a:t>
+            </a:r>
+            <a:endParaRPr lang="zh-CN" altLang="en-US" dirty="0"/>
+          </a:p>
+        </p:txBody>
+      </p:sp>
+      <p:sp>
+        <p:nvSpPr>
+          <p:cNvPr id="11" name="右箭头 10"/>
+          <p:cNvSpPr/>
+          <p:nvPr/>
+        </p:nvSpPr>
+        <p:spPr>
+          <a:xfrm>
+            <a:off x="1574799" y="3174998"/>
+            <a:ext cx="711200" cy="152400"/>
+          </a:xfrm>
+          <a:prstGeom prst="rightArrow">
+            <a:avLst/>
+          </a:prstGeom>
+        </p:spPr>
+        <p:style>
+          <a:lnRef idx="2">
+            <a:schemeClr val="accent1">
+              <a:shade val="50000"/>
+            </a:schemeClr>
+          </a:lnRef>
+          <a:fillRef idx="1">
+            <a:schemeClr val="accent1"/>
+          </a:fillRef>
+          <a:effectRef idx="0">
+            <a:schemeClr val="accent1"/>
+          </a:effectRef>
+          <a:fontRef idx="minor">
+            <a:schemeClr val="lt1"/>
+          </a:fontRef>
+        </p:style>
+        <p:txBody>
+          <a:bodyPr rtlCol="0" anchor="ctr"/>
+          <a:lstStyle/>
+          <a:p>
+            <a:pPr algn="ctr"/>
+            <a:endParaRPr lang="zh-CN" altLang="en-US"/>
+          </a:p>
+        </p:txBody>
+      </p:sp>
+      <p:sp>
+        <p:nvSpPr>
+          <p:cNvPr id="12" name="右箭头 11"/>
+          <p:cNvSpPr/>
+          <p:nvPr/>
+        </p:nvSpPr>
+        <p:spPr>
+          <a:xfrm rot="19412054">
+            <a:off x="3288875" y="2290906"/>
+            <a:ext cx="1591732" cy="211666"/>
+          </a:xfrm>
+          <a:prstGeom prst="rightArrow">
+            <a:avLst/>
+          </a:prstGeom>
+        </p:spPr>
+        <p:style>
+          <a:lnRef idx="2">
+            <a:schemeClr val="accent1">
+              <a:shade val="50000"/>
+            </a:schemeClr>
+          </a:lnRef>
+          <a:fillRef idx="1">
+            <a:schemeClr val="accent1"/>
+          </a:fillRef>
+          <a:effectRef idx="0">
+            <a:schemeClr val="accent1"/>
+          </a:effectRef>
+          <a:fontRef idx="minor">
+            <a:schemeClr val="lt1"/>
+          </a:fontRef>
+        </p:style>
+        <p:txBody>
+          <a:bodyPr rtlCol="0" anchor="ctr"/>
+          <a:lstStyle/>
+          <a:p>
+            <a:pPr algn="ctr"/>
+            <a:endParaRPr lang="zh-CN" altLang="en-US"/>
+          </a:p>
+        </p:txBody>
+      </p:sp>
+      <p:sp>
+        <p:nvSpPr>
+          <p:cNvPr id="13" name="右箭头 12"/>
+          <p:cNvSpPr/>
+          <p:nvPr/>
+        </p:nvSpPr>
+        <p:spPr>
+          <a:xfrm rot="2574232">
+            <a:off x="3339681" y="4024560"/>
+            <a:ext cx="1591732" cy="211666"/>
+          </a:xfrm>
+          <a:prstGeom prst="rightArrow">
+            <a:avLst/>
+          </a:prstGeom>
+        </p:spPr>
+        <p:style>
+          <a:lnRef idx="2">
+            <a:schemeClr val="accent1">
+              <a:shade val="50000"/>
+            </a:schemeClr>
+          </a:lnRef>
+          <a:fillRef idx="1">
+            <a:schemeClr val="accent1"/>
+          </a:fillRef>
+          <a:effectRef idx="0">
+            <a:schemeClr val="accent1"/>
+          </a:effectRef>
+          <a:fontRef idx="minor">
+            <a:schemeClr val="lt1"/>
+          </a:fontRef>
+        </p:style>
+        <p:txBody>
+          <a:bodyPr rtlCol="0" anchor="ctr"/>
+          <a:lstStyle/>
+          <a:p>
+            <a:pPr algn="ctr"/>
+            <a:endParaRPr lang="zh-CN" altLang="en-US"/>
+          </a:p>
+        </p:txBody>
+      </p:sp>
+      <p:sp>
+        <p:nvSpPr>
+          <p:cNvPr id="14" name="流程图: 磁盘 13"/>
+          <p:cNvSpPr/>
+          <p:nvPr/>
+        </p:nvSpPr>
+        <p:spPr>
+          <a:xfrm>
+            <a:off x="8516735" y="2772833"/>
+            <a:ext cx="1193800" cy="1219200"/>
+          </a:xfrm>
+          <a:prstGeom prst="flowChartMagneticDisk">
+            <a:avLst/>
+          </a:prstGeom>
+          <a:solidFill>
+            <a:schemeClr val="accent2">
+              <a:lumMod val="40000"/>
+              <a:lumOff val="60000"/>
+            </a:schemeClr>
+          </a:solidFill>
+        </p:spPr>
+        <p:style>
+          <a:lnRef idx="2">
+            <a:schemeClr val="accent1">
+              <a:shade val="50000"/>
+            </a:schemeClr>
+          </a:lnRef>
+          <a:fillRef idx="1">
+            <a:schemeClr val="accent1"/>
+          </a:fillRef>
+          <a:effectRef idx="0">
+            <a:schemeClr val="accent1"/>
+          </a:effectRef>
+          <a:fontRef idx="minor">
+            <a:schemeClr val="lt1"/>
+          </a:fontRef>
+        </p:style>
+        <p:txBody>
+          <a:bodyPr rtlCol="0" anchor="ctr"/>
+          <a:lstStyle/>
+          <a:p>
+            <a:pPr algn="ctr"/>
+            <a:r>
+              <a:rPr lang="en-US" altLang="zh-CN" dirty="0" smtClean="0"/>
+              <a:t>Session</a:t>
+            </a:r>
+            <a:endParaRPr lang="zh-CN" altLang="en-US" dirty="0"/>
+          </a:p>
+        </p:txBody>
+      </p:sp>
+      <p:sp>
+        <p:nvSpPr>
+          <p:cNvPr id="15" name="右箭头 14"/>
+          <p:cNvSpPr/>
+          <p:nvPr/>
+        </p:nvSpPr>
+        <p:spPr>
+          <a:xfrm rot="1900979">
+            <a:off x="7125339" y="2324103"/>
+            <a:ext cx="1591732" cy="211666"/>
+          </a:xfrm>
+          <a:prstGeom prst="rightArrow">
+            <a:avLst/>
+          </a:prstGeom>
+        </p:spPr>
+        <p:style>
+          <a:lnRef idx="2">
+            <a:schemeClr val="accent1">
+              <a:shade val="50000"/>
+            </a:schemeClr>
+          </a:lnRef>
+          <a:fillRef idx="1">
+            <a:schemeClr val="accent1"/>
+          </a:fillRef>
+          <a:effectRef idx="0">
+            <a:schemeClr val="accent1"/>
+          </a:effectRef>
+          <a:fontRef idx="minor">
+            <a:schemeClr val="lt1"/>
+          </a:fontRef>
+        </p:style>
+        <p:txBody>
+          <a:bodyPr rtlCol="0" anchor="ctr"/>
+          <a:lstStyle/>
+          <a:p>
+            <a:pPr algn="ctr"/>
+            <a:endParaRPr lang="zh-CN" altLang="en-US"/>
+          </a:p>
+        </p:txBody>
+      </p:sp>
+      <p:sp>
+        <p:nvSpPr>
+          <p:cNvPr id="16" name="右箭头 15"/>
+          <p:cNvSpPr/>
+          <p:nvPr/>
+        </p:nvSpPr>
+        <p:spPr>
+          <a:xfrm rot="19815762">
+            <a:off x="7126601" y="4196193"/>
+            <a:ext cx="1591732" cy="211666"/>
+          </a:xfrm>
+          <a:prstGeom prst="rightArrow">
+            <a:avLst/>
+          </a:prstGeom>
+        </p:spPr>
+        <p:style>
+          <a:lnRef idx="2">
+            <a:schemeClr val="accent1">
+              <a:shade val="50000"/>
+            </a:schemeClr>
+          </a:lnRef>
+          <a:fillRef idx="1">
+            <a:schemeClr val="accent1"/>
+          </a:fillRef>
+          <a:effectRef idx="0">
+            <a:schemeClr val="accent1"/>
+          </a:effectRef>
+          <a:fontRef idx="minor">
+            <a:schemeClr val="lt1"/>
+          </a:fontRef>
+        </p:style>
+        <p:txBody>
+          <a:bodyPr rtlCol="0" anchor="ctr"/>
+          <a:lstStyle/>
+          <a:p>
+            <a:pPr algn="ctr"/>
+            <a:endParaRPr lang="zh-CN" altLang="en-US"/>
+          </a:p>
+        </p:txBody>
+      </p:sp>
+      <p:pic>
+        <p:nvPicPr>
+          <p:cNvPr id="18" name="图片 17"/>
+          <p:cNvPicPr>
+            <a:picLocks noChangeAspect="1"/>
+          </p:cNvPicPr>
+          <p:nvPr/>
+        </p:nvPicPr>
+        <p:blipFill>
+          <a:blip r:embed="rId2"/>
+          <a:stretch>
+            <a:fillRect/>
+          </a:stretch>
+        </p:blipFill>
+        <p:spPr>
+          <a:xfrm>
+            <a:off x="8666021" y="748983"/>
+            <a:ext cx="2813416" cy="2189018"/>
+          </a:xfrm>
+          <a:prstGeom prst="rect">
+            <a:avLst/>
+          </a:prstGeom>
+        </p:spPr>
+      </p:pic>
+    </p:spTree>
+    <p:extLst>
+      <p:ext uri="{BB962C8B-B14F-4D97-AF65-F5344CB8AC3E}">
+        <p14:creationId xmlns:p14="http://schemas.microsoft.com/office/powerpoint/2010/main" val="3683091910"/>
+      </p:ext>
+    </p:extLst>
+  </p:cSld>
+  <p:clrMapOvr>
+    <a:masterClrMapping/>
+  </p:clrMapOvr>
+</p:sld>
+</file>
+
 <file path=ppt/theme/theme1.xml><?xml version="1.0" encoding="utf-8"?>
 <a:theme xmlns:a="http://schemas.openxmlformats.org/drawingml/2006/main" name="Office 主题​​">
   <a:themeElements>

</xml_diff>